<commit_message>
add: readme of beginWork
</commit_message>
<xml_diff>
--- a/src/components/TasksWithDifferentPriorities/更新流程.pptx
+++ b/src/components/TasksWithDifferentPriorities/更新流程.pptx
@@ -7,6 +7,7 @@
   <p:sldIdLst>
     <p:sldId id="256" r:id="rId2"/>
     <p:sldId id="257" r:id="rId3"/>
+    <p:sldId id="258" r:id="rId4"/>
   </p:sldIdLst>
   <p:sldSz cx="12192000" cy="6858000"/>
   <p:notesSz cx="6858000" cy="9144000"/>
@@ -260,7 +261,7 @@
           <a:p>
             <a:fld id="{630028CD-74F5-46B3-BF67-5601DA750C76}" type="datetimeFigureOut">
               <a:rPr lang="zh-CN" altLang="en-US" smtClean="0"/>
-              <a:t>2020/8/12 Wednesday</a:t>
+              <a:t>2020/8/15 Saturday</a:t>
             </a:fld>
             <a:endParaRPr lang="zh-CN" altLang="en-US"/>
           </a:p>
@@ -458,7 +459,7 @@
           <a:p>
             <a:fld id="{630028CD-74F5-46B3-BF67-5601DA750C76}" type="datetimeFigureOut">
               <a:rPr lang="zh-CN" altLang="en-US" smtClean="0"/>
-              <a:t>2020/8/12 Wednesday</a:t>
+              <a:t>2020/8/15 Saturday</a:t>
             </a:fld>
             <a:endParaRPr lang="zh-CN" altLang="en-US"/>
           </a:p>
@@ -666,7 +667,7 @@
           <a:p>
             <a:fld id="{630028CD-74F5-46B3-BF67-5601DA750C76}" type="datetimeFigureOut">
               <a:rPr lang="zh-CN" altLang="en-US" smtClean="0"/>
-              <a:t>2020/8/12 Wednesday</a:t>
+              <a:t>2020/8/15 Saturday</a:t>
             </a:fld>
             <a:endParaRPr lang="zh-CN" altLang="en-US"/>
           </a:p>
@@ -864,7 +865,7 @@
           <a:p>
             <a:fld id="{630028CD-74F5-46B3-BF67-5601DA750C76}" type="datetimeFigureOut">
               <a:rPr lang="zh-CN" altLang="en-US" smtClean="0"/>
-              <a:t>2020/8/12 Wednesday</a:t>
+              <a:t>2020/8/15 Saturday</a:t>
             </a:fld>
             <a:endParaRPr lang="zh-CN" altLang="en-US"/>
           </a:p>
@@ -1139,7 +1140,7 @@
           <a:p>
             <a:fld id="{630028CD-74F5-46B3-BF67-5601DA750C76}" type="datetimeFigureOut">
               <a:rPr lang="zh-CN" altLang="en-US" smtClean="0"/>
-              <a:t>2020/8/12 Wednesday</a:t>
+              <a:t>2020/8/15 Saturday</a:t>
             </a:fld>
             <a:endParaRPr lang="zh-CN" altLang="en-US"/>
           </a:p>
@@ -1404,7 +1405,7 @@
           <a:p>
             <a:fld id="{630028CD-74F5-46B3-BF67-5601DA750C76}" type="datetimeFigureOut">
               <a:rPr lang="zh-CN" altLang="en-US" smtClean="0"/>
-              <a:t>2020/8/12 Wednesday</a:t>
+              <a:t>2020/8/15 Saturday</a:t>
             </a:fld>
             <a:endParaRPr lang="zh-CN" altLang="en-US"/>
           </a:p>
@@ -1816,7 +1817,7 @@
           <a:p>
             <a:fld id="{630028CD-74F5-46B3-BF67-5601DA750C76}" type="datetimeFigureOut">
               <a:rPr lang="zh-CN" altLang="en-US" smtClean="0"/>
-              <a:t>2020/8/12 Wednesday</a:t>
+              <a:t>2020/8/15 Saturday</a:t>
             </a:fld>
             <a:endParaRPr lang="zh-CN" altLang="en-US"/>
           </a:p>
@@ -1957,7 +1958,7 @@
           <a:p>
             <a:fld id="{630028CD-74F5-46B3-BF67-5601DA750C76}" type="datetimeFigureOut">
               <a:rPr lang="zh-CN" altLang="en-US" smtClean="0"/>
-              <a:t>2020/8/12 Wednesday</a:t>
+              <a:t>2020/8/15 Saturday</a:t>
             </a:fld>
             <a:endParaRPr lang="zh-CN" altLang="en-US"/>
           </a:p>
@@ -2070,7 +2071,7 @@
           <a:p>
             <a:fld id="{630028CD-74F5-46B3-BF67-5601DA750C76}" type="datetimeFigureOut">
               <a:rPr lang="zh-CN" altLang="en-US" smtClean="0"/>
-              <a:t>2020/8/12 Wednesday</a:t>
+              <a:t>2020/8/15 Saturday</a:t>
             </a:fld>
             <a:endParaRPr lang="zh-CN" altLang="en-US"/>
           </a:p>
@@ -2381,7 +2382,7 @@
           <a:p>
             <a:fld id="{630028CD-74F5-46B3-BF67-5601DA750C76}" type="datetimeFigureOut">
               <a:rPr lang="zh-CN" altLang="en-US" smtClean="0"/>
-              <a:t>2020/8/12 Wednesday</a:t>
+              <a:t>2020/8/15 Saturday</a:t>
             </a:fld>
             <a:endParaRPr lang="zh-CN" altLang="en-US"/>
           </a:p>
@@ -2669,7 +2670,7 @@
           <a:p>
             <a:fld id="{630028CD-74F5-46B3-BF67-5601DA750C76}" type="datetimeFigureOut">
               <a:rPr lang="zh-CN" altLang="en-US" smtClean="0"/>
-              <a:t>2020/8/12 Wednesday</a:t>
+              <a:t>2020/8/15 Saturday</a:t>
             </a:fld>
             <a:endParaRPr lang="zh-CN" altLang="en-US"/>
           </a:p>
@@ -2910,7 +2911,7 @@
           <a:p>
             <a:fld id="{630028CD-74F5-46B3-BF67-5601DA750C76}" type="datetimeFigureOut">
               <a:rPr lang="zh-CN" altLang="en-US" smtClean="0"/>
-              <a:t>2020/8/12 Wednesday</a:t>
+              <a:t>2020/8/15 Saturday</a:t>
             </a:fld>
             <a:endParaRPr lang="zh-CN" altLang="en-US"/>
           </a:p>
@@ -9129,7 +9130,7 @@
                                     <p:cond delay="0"/>
                                   </p:stCondLst>
                                   <p:childTnLst>
-                                    <p:animMotion origin="layout" path="M 0 0 L 0 0.25 E" pathEditMode="relative" ptsTypes="">
+                                    <p:animMotion origin="layout" path="M -4.79167E-6 -3.7037E-6 L -4.79167E-6 0.25 " pathEditMode="relative" rAng="0" ptsTypes="AA">
                                       <p:cBhvr>
                                         <p:cTn id="28" dur="1000" fill="hold"/>
                                         <p:tgtEl>
@@ -9140,6 +9141,7 @@
                                           <p:attrName>ppt_y</p:attrName>
                                         </p:attrNameLst>
                                       </p:cBhvr>
+                                      <p:rCtr x="0" y="12500"/>
                                     </p:animMotion>
                                   </p:childTnLst>
                                 </p:cTn>
@@ -9249,7 +9251,7 @@
                                           <p:attrName>ppt_y</p:attrName>
                                         </p:attrNameLst>
                                       </p:cBhvr>
-                                      <p:rCtr x="0" y="11991"/>
+                                      <p:rCtr x="0" y="11875"/>
                                     </p:animMotion>
                                   </p:childTnLst>
                                 </p:cTn>
@@ -9348,7 +9350,7 @@
                                     <p:cond delay="0"/>
                                   </p:stCondLst>
                                   <p:childTnLst>
-                                    <p:animMotion origin="layout" path="M -4.79167E-6 0.48773 L -4.79167E-6 0.72315 " pathEditMode="relative" rAng="0" ptsTypes="AA">
+                                    <p:animMotion origin="layout" path="M -4.79167E-6 0.48774 L -4.79167E-6 0.72315 " pathEditMode="relative" rAng="0" ptsTypes="AA">
                                       <p:cBhvr>
                                         <p:cTn id="48" dur="1000" fill="hold"/>
                                         <p:tgtEl>
@@ -9359,7 +9361,7 @@
                                           <p:attrName>ppt_y</p:attrName>
                                         </p:attrNameLst>
                                       </p:cBhvr>
-                                      <p:rCtr x="0" y="12106"/>
+                                      <p:rCtr x="0" y="11759"/>
                                     </p:animMotion>
                                   </p:childTnLst>
                                 </p:cTn>
@@ -9442,6 +9444,2961 @@
       <p:bldP spid="72" grpId="0" animBg="1"/>
       <p:bldP spid="82" grpId="0" animBg="1"/>
       <p:bldP spid="96" grpId="0"/>
+    </p:bldLst>
+  </p:timing>
+</p:sld>
+</file>
+
+<file path=ppt/slides/slide3.xml><?xml version="1.0" encoding="utf-8"?>
+<p:sld xmlns:a="http://schemas.openxmlformats.org/drawingml/2006/main" xmlns:r="http://schemas.openxmlformats.org/officeDocument/2006/relationships" xmlns:p="http://schemas.openxmlformats.org/presentationml/2006/main">
+  <p:cSld>
+    <p:spTree>
+      <p:nvGrpSpPr>
+        <p:cNvPr id="1" name=""/>
+        <p:cNvGrpSpPr/>
+        <p:nvPr/>
+      </p:nvGrpSpPr>
+      <p:grpSpPr>
+        <a:xfrm>
+          <a:off x="0" y="0"/>
+          <a:ext cx="0" cy="0"/>
+          <a:chOff x="0" y="0"/>
+          <a:chExt cx="0" cy="0"/>
+        </a:xfrm>
+      </p:grpSpPr>
+      <p:sp>
+        <p:nvSpPr>
+          <p:cNvPr id="5" name="矩形: 圆角 4">
+            <a:extLst>
+              <a:ext uri="{FF2B5EF4-FFF2-40B4-BE49-F238E27FC236}">
+                <a16:creationId xmlns:a16="http://schemas.microsoft.com/office/drawing/2014/main" id="{AEFFDFE0-5625-4687-BCD0-01632CE77941}"/>
+              </a:ext>
+            </a:extLst>
+          </p:cNvPr>
+          <p:cNvSpPr/>
+          <p:nvPr/>
+        </p:nvSpPr>
+        <p:spPr>
+          <a:xfrm>
+            <a:off x="1970523" y="948171"/>
+            <a:ext cx="1526797" cy="578840"/>
+          </a:xfrm>
+          <a:prstGeom prst="roundRect">
+            <a:avLst/>
+          </a:prstGeom>
+        </p:spPr>
+        <p:style>
+          <a:lnRef idx="2">
+            <a:schemeClr val="accent1">
+              <a:shade val="50000"/>
+            </a:schemeClr>
+          </a:lnRef>
+          <a:fillRef idx="1">
+            <a:schemeClr val="accent1"/>
+          </a:fillRef>
+          <a:effectRef idx="0">
+            <a:schemeClr val="accent1"/>
+          </a:effectRef>
+          <a:fontRef idx="minor">
+            <a:schemeClr val="lt1"/>
+          </a:fontRef>
+        </p:style>
+        <p:txBody>
+          <a:bodyPr rtlCol="0" anchor="ctr"/>
+          <a:lstStyle/>
+          <a:p>
+            <a:pPr algn="ctr"/>
+            <a:r>
+              <a:rPr lang="en-US" altLang="zh-CN" dirty="0" err="1"/>
+              <a:t>RootFiber</a:t>
+            </a:r>
+            <a:endParaRPr lang="zh-CN" altLang="en-US" dirty="0"/>
+          </a:p>
+        </p:txBody>
+      </p:sp>
+      <p:sp>
+        <p:nvSpPr>
+          <p:cNvPr id="7" name="矩形: 圆角 6">
+            <a:extLst>
+              <a:ext uri="{FF2B5EF4-FFF2-40B4-BE49-F238E27FC236}">
+                <a16:creationId xmlns:a16="http://schemas.microsoft.com/office/drawing/2014/main" id="{F8422B4F-A74F-4C3C-8B8E-6F7D1CDDE8EA}"/>
+              </a:ext>
+            </a:extLst>
+          </p:cNvPr>
+          <p:cNvSpPr/>
+          <p:nvPr/>
+        </p:nvSpPr>
+        <p:spPr>
+          <a:xfrm>
+            <a:off x="1970525" y="2664418"/>
+            <a:ext cx="1526797" cy="578840"/>
+          </a:xfrm>
+          <a:prstGeom prst="roundRect">
+            <a:avLst/>
+          </a:prstGeom>
+        </p:spPr>
+        <p:style>
+          <a:lnRef idx="2">
+            <a:schemeClr val="accent1">
+              <a:shade val="50000"/>
+            </a:schemeClr>
+          </a:lnRef>
+          <a:fillRef idx="1">
+            <a:schemeClr val="accent1"/>
+          </a:fillRef>
+          <a:effectRef idx="0">
+            <a:schemeClr val="accent1"/>
+          </a:effectRef>
+          <a:fontRef idx="minor">
+            <a:schemeClr val="lt1"/>
+          </a:fontRef>
+        </p:style>
+        <p:txBody>
+          <a:bodyPr rtlCol="0" anchor="ctr"/>
+          <a:lstStyle/>
+          <a:p>
+            <a:pPr algn="ctr"/>
+            <a:r>
+              <a:rPr lang="en-US" altLang="zh-CN" dirty="0"/>
+              <a:t>App</a:t>
+            </a:r>
+            <a:endParaRPr lang="zh-CN" altLang="en-US" dirty="0"/>
+          </a:p>
+        </p:txBody>
+      </p:sp>
+      <p:sp>
+        <p:nvSpPr>
+          <p:cNvPr id="9" name="矩形: 圆角 8">
+            <a:extLst>
+              <a:ext uri="{FF2B5EF4-FFF2-40B4-BE49-F238E27FC236}">
+                <a16:creationId xmlns:a16="http://schemas.microsoft.com/office/drawing/2014/main" id="{8BE6581C-1AAF-424F-B56F-6C76AD034313}"/>
+              </a:ext>
+            </a:extLst>
+          </p:cNvPr>
+          <p:cNvSpPr/>
+          <p:nvPr/>
+        </p:nvSpPr>
+        <p:spPr>
+          <a:xfrm>
+            <a:off x="1970522" y="4298873"/>
+            <a:ext cx="1526797" cy="578840"/>
+          </a:xfrm>
+          <a:prstGeom prst="roundRect">
+            <a:avLst/>
+          </a:prstGeom>
+        </p:spPr>
+        <p:style>
+          <a:lnRef idx="2">
+            <a:schemeClr val="accent1">
+              <a:shade val="50000"/>
+            </a:schemeClr>
+          </a:lnRef>
+          <a:fillRef idx="1">
+            <a:schemeClr val="accent1"/>
+          </a:fillRef>
+          <a:effectRef idx="0">
+            <a:schemeClr val="accent1"/>
+          </a:effectRef>
+          <a:fontRef idx="minor">
+            <a:schemeClr val="lt1"/>
+          </a:fontRef>
+        </p:style>
+        <p:txBody>
+          <a:bodyPr rtlCol="0" anchor="ctr"/>
+          <a:lstStyle/>
+          <a:p>
+            <a:pPr algn="ctr"/>
+            <a:r>
+              <a:rPr lang="en-US" altLang="zh-CN" dirty="0"/>
+              <a:t>Parent</a:t>
+            </a:r>
+            <a:endParaRPr lang="zh-CN" altLang="en-US" dirty="0"/>
+          </a:p>
+        </p:txBody>
+      </p:sp>
+      <p:sp>
+        <p:nvSpPr>
+          <p:cNvPr id="11" name="矩形: 圆角 10">
+            <a:extLst>
+              <a:ext uri="{FF2B5EF4-FFF2-40B4-BE49-F238E27FC236}">
+                <a16:creationId xmlns:a16="http://schemas.microsoft.com/office/drawing/2014/main" id="{9DFA742E-1A93-47EB-AD63-AEAE1FA004B2}"/>
+              </a:ext>
+            </a:extLst>
+          </p:cNvPr>
+          <p:cNvSpPr/>
+          <p:nvPr/>
+        </p:nvSpPr>
+        <p:spPr>
+          <a:xfrm>
+            <a:off x="1939696" y="5914078"/>
+            <a:ext cx="1526797" cy="578840"/>
+          </a:xfrm>
+          <a:prstGeom prst="roundRect">
+            <a:avLst/>
+          </a:prstGeom>
+        </p:spPr>
+        <p:style>
+          <a:lnRef idx="2">
+            <a:schemeClr val="accent1">
+              <a:shade val="50000"/>
+            </a:schemeClr>
+          </a:lnRef>
+          <a:fillRef idx="1">
+            <a:schemeClr val="accent1"/>
+          </a:fillRef>
+          <a:effectRef idx="0">
+            <a:schemeClr val="accent1"/>
+          </a:effectRef>
+          <a:fontRef idx="minor">
+            <a:schemeClr val="lt1"/>
+          </a:fontRef>
+        </p:style>
+        <p:txBody>
+          <a:bodyPr rtlCol="0" anchor="ctr"/>
+          <a:lstStyle/>
+          <a:p>
+            <a:pPr algn="ctr"/>
+            <a:r>
+              <a:rPr lang="en-US" altLang="zh-CN" dirty="0"/>
+              <a:t>Child</a:t>
+            </a:r>
+            <a:endParaRPr lang="zh-CN" altLang="en-US" dirty="0"/>
+          </a:p>
+        </p:txBody>
+      </p:sp>
+      <p:cxnSp>
+        <p:nvCxnSpPr>
+          <p:cNvPr id="13" name="直接箭头连接符 12">
+            <a:extLst>
+              <a:ext uri="{FF2B5EF4-FFF2-40B4-BE49-F238E27FC236}">
+                <a16:creationId xmlns:a16="http://schemas.microsoft.com/office/drawing/2014/main" id="{7A44504A-61BE-43E8-9D74-8E48F0887FB6}"/>
+              </a:ext>
+            </a:extLst>
+          </p:cNvPr>
+          <p:cNvCxnSpPr/>
+          <p:nvPr/>
+        </p:nvCxnSpPr>
+        <p:spPr>
+          <a:xfrm>
+            <a:off x="2465476" y="1527011"/>
+            <a:ext cx="0" cy="1137407"/>
+          </a:xfrm>
+          <a:prstGeom prst="straightConnector1">
+            <a:avLst/>
+          </a:prstGeom>
+          <a:ln>
+            <a:tailEnd type="triangle"/>
+          </a:ln>
+        </p:spPr>
+        <p:style>
+          <a:lnRef idx="3">
+            <a:schemeClr val="accent1"/>
+          </a:lnRef>
+          <a:fillRef idx="0">
+            <a:schemeClr val="accent1"/>
+          </a:fillRef>
+          <a:effectRef idx="2">
+            <a:schemeClr val="accent1"/>
+          </a:effectRef>
+          <a:fontRef idx="minor">
+            <a:schemeClr val="tx1"/>
+          </a:fontRef>
+        </p:style>
+      </p:cxnSp>
+      <p:cxnSp>
+        <p:nvCxnSpPr>
+          <p:cNvPr id="14" name="直接箭头连接符 13">
+            <a:extLst>
+              <a:ext uri="{FF2B5EF4-FFF2-40B4-BE49-F238E27FC236}">
+                <a16:creationId xmlns:a16="http://schemas.microsoft.com/office/drawing/2014/main" id="{8876FC8D-7789-4702-8D95-47EA10C40C1A}"/>
+              </a:ext>
+            </a:extLst>
+          </p:cNvPr>
+          <p:cNvCxnSpPr/>
+          <p:nvPr/>
+        </p:nvCxnSpPr>
+        <p:spPr>
+          <a:xfrm>
+            <a:off x="2465476" y="3161466"/>
+            <a:ext cx="0" cy="1137407"/>
+          </a:xfrm>
+          <a:prstGeom prst="straightConnector1">
+            <a:avLst/>
+          </a:prstGeom>
+          <a:ln>
+            <a:tailEnd type="triangle"/>
+          </a:ln>
+        </p:spPr>
+        <p:style>
+          <a:lnRef idx="3">
+            <a:schemeClr val="accent1"/>
+          </a:lnRef>
+          <a:fillRef idx="0">
+            <a:schemeClr val="accent1"/>
+          </a:fillRef>
+          <a:effectRef idx="2">
+            <a:schemeClr val="accent1"/>
+          </a:effectRef>
+          <a:fontRef idx="minor">
+            <a:schemeClr val="tx1"/>
+          </a:fontRef>
+        </p:style>
+      </p:cxnSp>
+      <p:cxnSp>
+        <p:nvCxnSpPr>
+          <p:cNvPr id="15" name="直接箭头连接符 14">
+            <a:extLst>
+              <a:ext uri="{FF2B5EF4-FFF2-40B4-BE49-F238E27FC236}">
+                <a16:creationId xmlns:a16="http://schemas.microsoft.com/office/drawing/2014/main" id="{371E04DC-B4AD-418D-BA29-1FCDFB735D18}"/>
+              </a:ext>
+            </a:extLst>
+          </p:cNvPr>
+          <p:cNvCxnSpPr>
+            <a:cxnSpLocks/>
+          </p:cNvCxnSpPr>
+          <p:nvPr/>
+        </p:nvCxnSpPr>
+        <p:spPr>
+          <a:xfrm>
+            <a:off x="2466874" y="4936435"/>
+            <a:ext cx="0" cy="977643"/>
+          </a:xfrm>
+          <a:prstGeom prst="straightConnector1">
+            <a:avLst/>
+          </a:prstGeom>
+          <a:ln>
+            <a:tailEnd type="triangle"/>
+          </a:ln>
+        </p:spPr>
+        <p:style>
+          <a:lnRef idx="3">
+            <a:schemeClr val="accent1"/>
+          </a:lnRef>
+          <a:fillRef idx="0">
+            <a:schemeClr val="accent1"/>
+          </a:fillRef>
+          <a:effectRef idx="2">
+            <a:schemeClr val="accent1"/>
+          </a:effectRef>
+          <a:fontRef idx="minor">
+            <a:schemeClr val="tx1"/>
+          </a:fontRef>
+        </p:style>
+      </p:cxnSp>
+      <p:cxnSp>
+        <p:nvCxnSpPr>
+          <p:cNvPr id="16" name="直接箭头连接符 15">
+            <a:extLst>
+              <a:ext uri="{FF2B5EF4-FFF2-40B4-BE49-F238E27FC236}">
+                <a16:creationId xmlns:a16="http://schemas.microsoft.com/office/drawing/2014/main" id="{94C6FBCC-1D6D-4D38-8F61-DA7E61B0013B}"/>
+              </a:ext>
+            </a:extLst>
+          </p:cNvPr>
+          <p:cNvCxnSpPr>
+            <a:cxnSpLocks/>
+          </p:cNvCxnSpPr>
+          <p:nvPr/>
+        </p:nvCxnSpPr>
+        <p:spPr>
+          <a:xfrm flipV="1">
+            <a:off x="2852767" y="1527011"/>
+            <a:ext cx="0" cy="1163974"/>
+          </a:xfrm>
+          <a:prstGeom prst="straightConnector1">
+            <a:avLst/>
+          </a:prstGeom>
+          <a:ln>
+            <a:tailEnd type="triangle"/>
+          </a:ln>
+        </p:spPr>
+        <p:style>
+          <a:lnRef idx="3">
+            <a:schemeClr val="accent1"/>
+          </a:lnRef>
+          <a:fillRef idx="0">
+            <a:schemeClr val="accent1"/>
+          </a:fillRef>
+          <a:effectRef idx="2">
+            <a:schemeClr val="accent1"/>
+          </a:effectRef>
+          <a:fontRef idx="minor">
+            <a:schemeClr val="tx1"/>
+          </a:fontRef>
+        </p:style>
+      </p:cxnSp>
+      <p:cxnSp>
+        <p:nvCxnSpPr>
+          <p:cNvPr id="18" name="直接箭头连接符 17">
+            <a:extLst>
+              <a:ext uri="{FF2B5EF4-FFF2-40B4-BE49-F238E27FC236}">
+                <a16:creationId xmlns:a16="http://schemas.microsoft.com/office/drawing/2014/main" id="{0C7B21CC-707B-4A13-A2E9-1B8973CA83FD}"/>
+              </a:ext>
+            </a:extLst>
+          </p:cNvPr>
+          <p:cNvCxnSpPr>
+            <a:cxnSpLocks/>
+          </p:cNvCxnSpPr>
+          <p:nvPr/>
+        </p:nvCxnSpPr>
+        <p:spPr>
+          <a:xfrm flipV="1">
+            <a:off x="2852767" y="3243258"/>
+            <a:ext cx="0" cy="1055615"/>
+          </a:xfrm>
+          <a:prstGeom prst="straightConnector1">
+            <a:avLst/>
+          </a:prstGeom>
+          <a:ln>
+            <a:tailEnd type="triangle"/>
+          </a:ln>
+        </p:spPr>
+        <p:style>
+          <a:lnRef idx="3">
+            <a:schemeClr val="accent1"/>
+          </a:lnRef>
+          <a:fillRef idx="0">
+            <a:schemeClr val="accent1"/>
+          </a:fillRef>
+          <a:effectRef idx="2">
+            <a:schemeClr val="accent1"/>
+          </a:effectRef>
+          <a:fontRef idx="minor">
+            <a:schemeClr val="tx1"/>
+          </a:fontRef>
+        </p:style>
+      </p:cxnSp>
+      <p:cxnSp>
+        <p:nvCxnSpPr>
+          <p:cNvPr id="19" name="直接箭头连接符 18">
+            <a:extLst>
+              <a:ext uri="{FF2B5EF4-FFF2-40B4-BE49-F238E27FC236}">
+                <a16:creationId xmlns:a16="http://schemas.microsoft.com/office/drawing/2014/main" id="{35BC45AB-528B-4257-9BE8-9305A014B27D}"/>
+              </a:ext>
+            </a:extLst>
+          </p:cNvPr>
+          <p:cNvCxnSpPr>
+            <a:cxnSpLocks/>
+          </p:cNvCxnSpPr>
+          <p:nvPr/>
+        </p:nvCxnSpPr>
+        <p:spPr>
+          <a:xfrm flipV="1">
+            <a:off x="2852767" y="4877713"/>
+            <a:ext cx="0" cy="1163974"/>
+          </a:xfrm>
+          <a:prstGeom prst="straightConnector1">
+            <a:avLst/>
+          </a:prstGeom>
+          <a:ln>
+            <a:tailEnd type="triangle"/>
+          </a:ln>
+        </p:spPr>
+        <p:style>
+          <a:lnRef idx="3">
+            <a:schemeClr val="accent1"/>
+          </a:lnRef>
+          <a:fillRef idx="0">
+            <a:schemeClr val="accent1"/>
+          </a:fillRef>
+          <a:effectRef idx="2">
+            <a:schemeClr val="accent1"/>
+          </a:effectRef>
+          <a:fontRef idx="minor">
+            <a:schemeClr val="tx1"/>
+          </a:fontRef>
+        </p:style>
+      </p:cxnSp>
+      <p:sp>
+        <p:nvSpPr>
+          <p:cNvPr id="50" name="矩形: 圆角 49">
+            <a:extLst>
+              <a:ext uri="{FF2B5EF4-FFF2-40B4-BE49-F238E27FC236}">
+                <a16:creationId xmlns:a16="http://schemas.microsoft.com/office/drawing/2014/main" id="{7BF1C3EF-48EF-4129-8C59-6D3DC6A20128}"/>
+              </a:ext>
+            </a:extLst>
+          </p:cNvPr>
+          <p:cNvSpPr/>
+          <p:nvPr/>
+        </p:nvSpPr>
+        <p:spPr>
+          <a:xfrm>
+            <a:off x="5635163" y="937761"/>
+            <a:ext cx="1526797" cy="578840"/>
+          </a:xfrm>
+          <a:prstGeom prst="roundRect">
+            <a:avLst/>
+          </a:prstGeom>
+        </p:spPr>
+        <p:style>
+          <a:lnRef idx="1">
+            <a:schemeClr val="accent5"/>
+          </a:lnRef>
+          <a:fillRef idx="2">
+            <a:schemeClr val="accent5"/>
+          </a:fillRef>
+          <a:effectRef idx="1">
+            <a:schemeClr val="accent5"/>
+          </a:effectRef>
+          <a:fontRef idx="minor">
+            <a:schemeClr val="dk1"/>
+          </a:fontRef>
+        </p:style>
+        <p:txBody>
+          <a:bodyPr rtlCol="0" anchor="ctr"/>
+          <a:lstStyle/>
+          <a:p>
+            <a:pPr algn="ctr"/>
+            <a:r>
+              <a:rPr lang="en-US" altLang="zh-CN" sz="1600" dirty="0" err="1"/>
+              <a:t>WIP:RootFiber</a:t>
+            </a:r>
+            <a:endParaRPr lang="zh-CN" altLang="en-US" sz="1600" dirty="0"/>
+          </a:p>
+        </p:txBody>
+      </p:sp>
+      <p:sp>
+        <p:nvSpPr>
+          <p:cNvPr id="51" name="文本框 50">
+            <a:extLst>
+              <a:ext uri="{FF2B5EF4-FFF2-40B4-BE49-F238E27FC236}">
+                <a16:creationId xmlns:a16="http://schemas.microsoft.com/office/drawing/2014/main" id="{708174C0-9CF2-4E22-8169-F2C863E91180}"/>
+              </a:ext>
+            </a:extLst>
+          </p:cNvPr>
+          <p:cNvSpPr txBox="1"/>
+          <p:nvPr/>
+        </p:nvSpPr>
+        <p:spPr>
+          <a:xfrm>
+            <a:off x="3858828" y="360054"/>
+            <a:ext cx="1309553" cy="523220"/>
+          </a:xfrm>
+          <a:prstGeom prst="rect">
+            <a:avLst/>
+          </a:prstGeom>
+          <a:noFill/>
+        </p:spPr>
+        <p:txBody>
+          <a:bodyPr wrap="square" rtlCol="0">
+            <a:spAutoFit/>
+          </a:bodyPr>
+          <a:lstStyle/>
+          <a:p>
+            <a:r>
+              <a:rPr lang="en-US" altLang="zh-CN" sz="1400" dirty="0"/>
+              <a:t>renderLanes:2</a:t>
+            </a:r>
+            <a:endParaRPr lang="zh-CN" altLang="en-US" sz="1400" dirty="0"/>
+          </a:p>
+          <a:p>
+            <a:endParaRPr lang="zh-CN" altLang="en-US" sz="1400" dirty="0"/>
+          </a:p>
+        </p:txBody>
+      </p:sp>
+      <p:sp>
+        <p:nvSpPr>
+          <p:cNvPr id="62" name="矩形: 圆角 61">
+            <a:extLst>
+              <a:ext uri="{FF2B5EF4-FFF2-40B4-BE49-F238E27FC236}">
+                <a16:creationId xmlns:a16="http://schemas.microsoft.com/office/drawing/2014/main" id="{F756E211-A776-4DB9-A4D8-04F76142B85F}"/>
+              </a:ext>
+            </a:extLst>
+          </p:cNvPr>
+          <p:cNvSpPr/>
+          <p:nvPr/>
+        </p:nvSpPr>
+        <p:spPr>
+          <a:xfrm>
+            <a:off x="5670951" y="2633235"/>
+            <a:ext cx="1526797" cy="578840"/>
+          </a:xfrm>
+          <a:prstGeom prst="roundRect">
+            <a:avLst/>
+          </a:prstGeom>
+        </p:spPr>
+        <p:style>
+          <a:lnRef idx="1">
+            <a:schemeClr val="accent5"/>
+          </a:lnRef>
+          <a:fillRef idx="2">
+            <a:schemeClr val="accent5"/>
+          </a:fillRef>
+          <a:effectRef idx="1">
+            <a:schemeClr val="accent5"/>
+          </a:effectRef>
+          <a:fontRef idx="minor">
+            <a:schemeClr val="dk1"/>
+          </a:fontRef>
+        </p:style>
+        <p:txBody>
+          <a:bodyPr rtlCol="0" anchor="ctr"/>
+          <a:lstStyle/>
+          <a:p>
+            <a:pPr algn="ctr"/>
+            <a:r>
+              <a:rPr lang="en-US" altLang="zh-CN" dirty="0"/>
+              <a:t>WIP:APP</a:t>
+            </a:r>
+            <a:endParaRPr lang="zh-CN" altLang="en-US" dirty="0"/>
+          </a:p>
+        </p:txBody>
+      </p:sp>
+      <p:grpSp>
+        <p:nvGrpSpPr>
+          <p:cNvPr id="68" name="组合 67">
+            <a:extLst>
+              <a:ext uri="{FF2B5EF4-FFF2-40B4-BE49-F238E27FC236}">
+                <a16:creationId xmlns:a16="http://schemas.microsoft.com/office/drawing/2014/main" id="{E644B800-109B-4A5C-B757-844363815437}"/>
+              </a:ext>
+            </a:extLst>
+          </p:cNvPr>
+          <p:cNvGrpSpPr/>
+          <p:nvPr/>
+        </p:nvGrpSpPr>
+        <p:grpSpPr>
+          <a:xfrm>
+            <a:off x="6249099" y="1533796"/>
+            <a:ext cx="380993" cy="1058228"/>
+            <a:chOff x="7173985" y="1541478"/>
+            <a:chExt cx="370514" cy="1009475"/>
+          </a:xfrm>
+        </p:grpSpPr>
+        <p:cxnSp>
+          <p:nvCxnSpPr>
+            <p:cNvPr id="61" name="直接箭头连接符 60">
+              <a:extLst>
+                <a:ext uri="{FF2B5EF4-FFF2-40B4-BE49-F238E27FC236}">
+                  <a16:creationId xmlns:a16="http://schemas.microsoft.com/office/drawing/2014/main" id="{ED0AFE05-D742-44E0-970D-959293B582BA}"/>
+                </a:ext>
+              </a:extLst>
+            </p:cNvPr>
+            <p:cNvCxnSpPr>
+              <a:cxnSpLocks/>
+            </p:cNvCxnSpPr>
+            <p:nvPr/>
+          </p:nvCxnSpPr>
+          <p:spPr>
+            <a:xfrm>
+              <a:off x="7173985" y="1543575"/>
+              <a:ext cx="0" cy="1007378"/>
+            </a:xfrm>
+            <a:prstGeom prst="straightConnector1">
+              <a:avLst/>
+            </a:prstGeom>
+            <a:ln>
+              <a:tailEnd type="triangle"/>
+            </a:ln>
+          </p:spPr>
+          <p:style>
+            <a:lnRef idx="3">
+              <a:schemeClr val="accent5"/>
+            </a:lnRef>
+            <a:fillRef idx="0">
+              <a:schemeClr val="accent5"/>
+            </a:fillRef>
+            <a:effectRef idx="2">
+              <a:schemeClr val="accent5"/>
+            </a:effectRef>
+            <a:fontRef idx="minor">
+              <a:schemeClr val="tx1"/>
+            </a:fontRef>
+          </p:style>
+        </p:cxnSp>
+        <p:cxnSp>
+          <p:nvCxnSpPr>
+            <p:cNvPr id="64" name="直接箭头连接符 63">
+              <a:extLst>
+                <a:ext uri="{FF2B5EF4-FFF2-40B4-BE49-F238E27FC236}">
+                  <a16:creationId xmlns:a16="http://schemas.microsoft.com/office/drawing/2014/main" id="{E317F4F4-4000-4DCB-8517-720118DA2B2A}"/>
+                </a:ext>
+              </a:extLst>
+            </p:cNvPr>
+            <p:cNvCxnSpPr>
+              <a:cxnSpLocks/>
+            </p:cNvCxnSpPr>
+            <p:nvPr/>
+          </p:nvCxnSpPr>
+          <p:spPr>
+            <a:xfrm flipV="1">
+              <a:off x="7544499" y="1541478"/>
+              <a:ext cx="0" cy="1009475"/>
+            </a:xfrm>
+            <a:prstGeom prst="straightConnector1">
+              <a:avLst/>
+            </a:prstGeom>
+            <a:ln>
+              <a:tailEnd type="triangle"/>
+            </a:ln>
+          </p:spPr>
+          <p:style>
+            <a:lnRef idx="3">
+              <a:schemeClr val="accent5"/>
+            </a:lnRef>
+            <a:fillRef idx="0">
+              <a:schemeClr val="accent5"/>
+            </a:fillRef>
+            <a:effectRef idx="2">
+              <a:schemeClr val="accent5"/>
+            </a:effectRef>
+            <a:fontRef idx="minor">
+              <a:schemeClr val="tx1"/>
+            </a:fontRef>
+          </p:style>
+        </p:cxnSp>
+      </p:grpSp>
+      <p:grpSp>
+        <p:nvGrpSpPr>
+          <p:cNvPr id="69" name="组合 68">
+            <a:extLst>
+              <a:ext uri="{FF2B5EF4-FFF2-40B4-BE49-F238E27FC236}">
+                <a16:creationId xmlns:a16="http://schemas.microsoft.com/office/drawing/2014/main" id="{6C4D2E41-37F6-4CEB-B7E1-0133219690C6}"/>
+              </a:ext>
+            </a:extLst>
+          </p:cNvPr>
+          <p:cNvGrpSpPr/>
+          <p:nvPr/>
+        </p:nvGrpSpPr>
+        <p:grpSpPr>
+          <a:xfrm>
+            <a:off x="6259578" y="3251189"/>
+            <a:ext cx="370514" cy="1009475"/>
+            <a:chOff x="7173985" y="1541478"/>
+            <a:chExt cx="370514" cy="1009475"/>
+          </a:xfrm>
+        </p:grpSpPr>
+        <p:cxnSp>
+          <p:nvCxnSpPr>
+            <p:cNvPr id="70" name="直接箭头连接符 69">
+              <a:extLst>
+                <a:ext uri="{FF2B5EF4-FFF2-40B4-BE49-F238E27FC236}">
+                  <a16:creationId xmlns:a16="http://schemas.microsoft.com/office/drawing/2014/main" id="{DE96B2AF-FB0D-4FEC-9214-E54DE9E60FD0}"/>
+                </a:ext>
+              </a:extLst>
+            </p:cNvPr>
+            <p:cNvCxnSpPr>
+              <a:cxnSpLocks/>
+            </p:cNvCxnSpPr>
+            <p:nvPr/>
+          </p:nvCxnSpPr>
+          <p:spPr>
+            <a:xfrm>
+              <a:off x="7173985" y="1543575"/>
+              <a:ext cx="0" cy="1007378"/>
+            </a:xfrm>
+            <a:prstGeom prst="straightConnector1">
+              <a:avLst/>
+            </a:prstGeom>
+            <a:ln>
+              <a:tailEnd type="triangle"/>
+            </a:ln>
+          </p:spPr>
+          <p:style>
+            <a:lnRef idx="3">
+              <a:schemeClr val="accent5"/>
+            </a:lnRef>
+            <a:fillRef idx="0">
+              <a:schemeClr val="accent5"/>
+            </a:fillRef>
+            <a:effectRef idx="2">
+              <a:schemeClr val="accent5"/>
+            </a:effectRef>
+            <a:fontRef idx="minor">
+              <a:schemeClr val="tx1"/>
+            </a:fontRef>
+          </p:style>
+        </p:cxnSp>
+        <p:cxnSp>
+          <p:nvCxnSpPr>
+            <p:cNvPr id="71" name="直接箭头连接符 70">
+              <a:extLst>
+                <a:ext uri="{FF2B5EF4-FFF2-40B4-BE49-F238E27FC236}">
+                  <a16:creationId xmlns:a16="http://schemas.microsoft.com/office/drawing/2014/main" id="{4398BD5A-9527-4980-B0D7-5FBA1FEF999F}"/>
+                </a:ext>
+              </a:extLst>
+            </p:cNvPr>
+            <p:cNvCxnSpPr>
+              <a:cxnSpLocks/>
+            </p:cNvCxnSpPr>
+            <p:nvPr/>
+          </p:nvCxnSpPr>
+          <p:spPr>
+            <a:xfrm flipV="1">
+              <a:off x="7544499" y="1541478"/>
+              <a:ext cx="0" cy="1009475"/>
+            </a:xfrm>
+            <a:prstGeom prst="straightConnector1">
+              <a:avLst/>
+            </a:prstGeom>
+            <a:ln>
+              <a:tailEnd type="triangle"/>
+            </a:ln>
+          </p:spPr>
+          <p:style>
+            <a:lnRef idx="3">
+              <a:schemeClr val="accent5"/>
+            </a:lnRef>
+            <a:fillRef idx="0">
+              <a:schemeClr val="accent5"/>
+            </a:fillRef>
+            <a:effectRef idx="2">
+              <a:schemeClr val="accent5"/>
+            </a:effectRef>
+            <a:fontRef idx="minor">
+              <a:schemeClr val="tx1"/>
+            </a:fontRef>
+          </p:style>
+        </p:cxnSp>
+      </p:grpSp>
+      <p:sp>
+        <p:nvSpPr>
+          <p:cNvPr id="72" name="矩形: 圆角 71">
+            <a:extLst>
+              <a:ext uri="{FF2B5EF4-FFF2-40B4-BE49-F238E27FC236}">
+                <a16:creationId xmlns:a16="http://schemas.microsoft.com/office/drawing/2014/main" id="{C263B95B-9710-42A0-B8CE-FB6BC5456045}"/>
+              </a:ext>
+            </a:extLst>
+          </p:cNvPr>
+          <p:cNvSpPr/>
+          <p:nvPr/>
+        </p:nvSpPr>
+        <p:spPr>
+          <a:xfrm>
+            <a:off x="5635164" y="4298873"/>
+            <a:ext cx="1526797" cy="578840"/>
+          </a:xfrm>
+          <a:prstGeom prst="roundRect">
+            <a:avLst/>
+          </a:prstGeom>
+        </p:spPr>
+        <p:style>
+          <a:lnRef idx="1">
+            <a:schemeClr val="accent5"/>
+          </a:lnRef>
+          <a:fillRef idx="2">
+            <a:schemeClr val="accent5"/>
+          </a:fillRef>
+          <a:effectRef idx="1">
+            <a:schemeClr val="accent5"/>
+          </a:effectRef>
+          <a:fontRef idx="minor">
+            <a:schemeClr val="dk1"/>
+          </a:fontRef>
+        </p:style>
+        <p:txBody>
+          <a:bodyPr rtlCol="0" anchor="ctr"/>
+          <a:lstStyle/>
+          <a:p>
+            <a:pPr algn="ctr"/>
+            <a:r>
+              <a:rPr lang="en-US" altLang="zh-CN" dirty="0" err="1"/>
+              <a:t>WIP:Parent</a:t>
+            </a:r>
+            <a:endParaRPr lang="zh-CN" altLang="en-US" dirty="0"/>
+          </a:p>
+        </p:txBody>
+      </p:sp>
+      <p:grpSp>
+        <p:nvGrpSpPr>
+          <p:cNvPr id="79" name="组合 78">
+            <a:extLst>
+              <a:ext uri="{FF2B5EF4-FFF2-40B4-BE49-F238E27FC236}">
+                <a16:creationId xmlns:a16="http://schemas.microsoft.com/office/drawing/2014/main" id="{7BEF0869-573B-4061-991D-EFABE185C583}"/>
+              </a:ext>
+            </a:extLst>
+          </p:cNvPr>
+          <p:cNvGrpSpPr/>
+          <p:nvPr/>
+        </p:nvGrpSpPr>
+        <p:grpSpPr>
+          <a:xfrm>
+            <a:off x="6249092" y="4897255"/>
+            <a:ext cx="370514" cy="1009475"/>
+            <a:chOff x="7173985" y="1541478"/>
+            <a:chExt cx="370514" cy="1009475"/>
+          </a:xfrm>
+        </p:grpSpPr>
+        <p:cxnSp>
+          <p:nvCxnSpPr>
+            <p:cNvPr id="80" name="直接箭头连接符 79">
+              <a:extLst>
+                <a:ext uri="{FF2B5EF4-FFF2-40B4-BE49-F238E27FC236}">
+                  <a16:creationId xmlns:a16="http://schemas.microsoft.com/office/drawing/2014/main" id="{DF28C34B-FEA8-489D-B39D-3E6354BCB86A}"/>
+                </a:ext>
+              </a:extLst>
+            </p:cNvPr>
+            <p:cNvCxnSpPr>
+              <a:cxnSpLocks/>
+            </p:cNvCxnSpPr>
+            <p:nvPr/>
+          </p:nvCxnSpPr>
+          <p:spPr>
+            <a:xfrm>
+              <a:off x="7173985" y="1543575"/>
+              <a:ext cx="0" cy="1007378"/>
+            </a:xfrm>
+            <a:prstGeom prst="straightConnector1">
+              <a:avLst/>
+            </a:prstGeom>
+            <a:ln>
+              <a:tailEnd type="triangle"/>
+            </a:ln>
+          </p:spPr>
+          <p:style>
+            <a:lnRef idx="3">
+              <a:schemeClr val="accent5"/>
+            </a:lnRef>
+            <a:fillRef idx="0">
+              <a:schemeClr val="accent5"/>
+            </a:fillRef>
+            <a:effectRef idx="2">
+              <a:schemeClr val="accent5"/>
+            </a:effectRef>
+            <a:fontRef idx="minor">
+              <a:schemeClr val="tx1"/>
+            </a:fontRef>
+          </p:style>
+        </p:cxnSp>
+        <p:cxnSp>
+          <p:nvCxnSpPr>
+            <p:cNvPr id="81" name="直接箭头连接符 80">
+              <a:extLst>
+                <a:ext uri="{FF2B5EF4-FFF2-40B4-BE49-F238E27FC236}">
+                  <a16:creationId xmlns:a16="http://schemas.microsoft.com/office/drawing/2014/main" id="{257DCCB2-CB0D-4B64-86B3-C0DE88FE0D06}"/>
+                </a:ext>
+              </a:extLst>
+            </p:cNvPr>
+            <p:cNvCxnSpPr>
+              <a:cxnSpLocks/>
+            </p:cNvCxnSpPr>
+            <p:nvPr/>
+          </p:nvCxnSpPr>
+          <p:spPr>
+            <a:xfrm flipV="1">
+              <a:off x="7544499" y="1541478"/>
+              <a:ext cx="0" cy="1009475"/>
+            </a:xfrm>
+            <a:prstGeom prst="straightConnector1">
+              <a:avLst/>
+            </a:prstGeom>
+            <a:ln>
+              <a:tailEnd type="triangle"/>
+            </a:ln>
+          </p:spPr>
+          <p:style>
+            <a:lnRef idx="3">
+              <a:schemeClr val="accent5"/>
+            </a:lnRef>
+            <a:fillRef idx="0">
+              <a:schemeClr val="accent5"/>
+            </a:fillRef>
+            <a:effectRef idx="2">
+              <a:schemeClr val="accent5"/>
+            </a:effectRef>
+            <a:fontRef idx="minor">
+              <a:schemeClr val="tx1"/>
+            </a:fontRef>
+          </p:style>
+        </p:cxnSp>
+      </p:grpSp>
+      <p:sp>
+        <p:nvSpPr>
+          <p:cNvPr id="82" name="矩形: 圆角 81">
+            <a:extLst>
+              <a:ext uri="{FF2B5EF4-FFF2-40B4-BE49-F238E27FC236}">
+                <a16:creationId xmlns:a16="http://schemas.microsoft.com/office/drawing/2014/main" id="{DD3F714D-A8DB-4DB8-AE81-5CD9003634AC}"/>
+              </a:ext>
+            </a:extLst>
+          </p:cNvPr>
+          <p:cNvSpPr/>
+          <p:nvPr/>
+        </p:nvSpPr>
+        <p:spPr>
+          <a:xfrm>
+            <a:off x="5635161" y="5897262"/>
+            <a:ext cx="1526797" cy="578840"/>
+          </a:xfrm>
+          <a:prstGeom prst="roundRect">
+            <a:avLst/>
+          </a:prstGeom>
+        </p:spPr>
+        <p:style>
+          <a:lnRef idx="1">
+            <a:schemeClr val="accent5"/>
+          </a:lnRef>
+          <a:fillRef idx="2">
+            <a:schemeClr val="accent5"/>
+          </a:fillRef>
+          <a:effectRef idx="1">
+            <a:schemeClr val="accent5"/>
+          </a:effectRef>
+          <a:fontRef idx="minor">
+            <a:schemeClr val="dk1"/>
+          </a:fontRef>
+        </p:style>
+        <p:txBody>
+          <a:bodyPr rtlCol="0" anchor="ctr"/>
+          <a:lstStyle/>
+          <a:p>
+            <a:pPr algn="ctr"/>
+            <a:r>
+              <a:rPr lang="en-US" altLang="zh-CN" dirty="0" err="1"/>
+              <a:t>WIP:Child</a:t>
+            </a:r>
+            <a:endParaRPr lang="zh-CN" altLang="en-US" dirty="0"/>
+          </a:p>
+        </p:txBody>
+      </p:sp>
+      <p:sp>
+        <p:nvSpPr>
+          <p:cNvPr id="94" name="文本框 93">
+            <a:extLst>
+              <a:ext uri="{FF2B5EF4-FFF2-40B4-BE49-F238E27FC236}">
+                <a16:creationId xmlns:a16="http://schemas.microsoft.com/office/drawing/2014/main" id="{1A84ABA1-DE97-4D7F-ABF4-A73A12699A58}"/>
+              </a:ext>
+            </a:extLst>
+          </p:cNvPr>
+          <p:cNvSpPr txBox="1"/>
+          <p:nvPr/>
+        </p:nvSpPr>
+        <p:spPr>
+          <a:xfrm>
+            <a:off x="1970522" y="257372"/>
+            <a:ext cx="1428596" cy="369332"/>
+          </a:xfrm>
+          <a:prstGeom prst="rect">
+            <a:avLst/>
+          </a:prstGeom>
+          <a:noFill/>
+        </p:spPr>
+        <p:txBody>
+          <a:bodyPr wrap="none" rtlCol="0">
+            <a:spAutoFit/>
+          </a:bodyPr>
+          <a:lstStyle/>
+          <a:p>
+            <a:r>
+              <a:rPr lang="en-US" altLang="zh-CN" dirty="0" err="1"/>
+              <a:t>Currnet</a:t>
+            </a:r>
+            <a:r>
+              <a:rPr lang="en-US" altLang="zh-CN" dirty="0"/>
+              <a:t> Tree</a:t>
+            </a:r>
+            <a:endParaRPr lang="zh-CN" altLang="en-US" dirty="0"/>
+          </a:p>
+        </p:txBody>
+      </p:sp>
+      <p:sp>
+        <p:nvSpPr>
+          <p:cNvPr id="96" name="文本框 95">
+            <a:extLst>
+              <a:ext uri="{FF2B5EF4-FFF2-40B4-BE49-F238E27FC236}">
+                <a16:creationId xmlns:a16="http://schemas.microsoft.com/office/drawing/2014/main" id="{81B485C6-F4B0-4077-9AA7-54550BD3EE7D}"/>
+              </a:ext>
+            </a:extLst>
+          </p:cNvPr>
+          <p:cNvSpPr txBox="1"/>
+          <p:nvPr/>
+        </p:nvSpPr>
+        <p:spPr>
+          <a:xfrm>
+            <a:off x="5345644" y="290832"/>
+            <a:ext cx="2207656" cy="369332"/>
+          </a:xfrm>
+          <a:prstGeom prst="rect">
+            <a:avLst/>
+          </a:prstGeom>
+          <a:noFill/>
+        </p:spPr>
+        <p:txBody>
+          <a:bodyPr wrap="none" rtlCol="0">
+            <a:spAutoFit/>
+          </a:bodyPr>
+          <a:lstStyle/>
+          <a:p>
+            <a:r>
+              <a:rPr lang="en-US" altLang="zh-CN" dirty="0" err="1"/>
+              <a:t>workInProgress</a:t>
+            </a:r>
+            <a:r>
+              <a:rPr lang="en-US" altLang="zh-CN" dirty="0"/>
+              <a:t> Tree</a:t>
+            </a:r>
+            <a:endParaRPr lang="zh-CN" altLang="en-US" dirty="0"/>
+          </a:p>
+        </p:txBody>
+      </p:sp>
+      <p:grpSp>
+        <p:nvGrpSpPr>
+          <p:cNvPr id="34" name="组合 33">
+            <a:extLst>
+              <a:ext uri="{FF2B5EF4-FFF2-40B4-BE49-F238E27FC236}">
+                <a16:creationId xmlns:a16="http://schemas.microsoft.com/office/drawing/2014/main" id="{6051BD06-BA0F-4269-A7F6-3FD05A19D880}"/>
+              </a:ext>
+            </a:extLst>
+          </p:cNvPr>
+          <p:cNvGrpSpPr/>
+          <p:nvPr/>
+        </p:nvGrpSpPr>
+        <p:grpSpPr>
+          <a:xfrm>
+            <a:off x="3599850" y="934725"/>
+            <a:ext cx="2035312" cy="403186"/>
+            <a:chOff x="5138613" y="889636"/>
+            <a:chExt cx="1989075" cy="328845"/>
+          </a:xfrm>
+        </p:grpSpPr>
+        <p:cxnSp>
+          <p:nvCxnSpPr>
+            <p:cNvPr id="53" name="直接箭头连接符 52">
+              <a:extLst>
+                <a:ext uri="{FF2B5EF4-FFF2-40B4-BE49-F238E27FC236}">
+                  <a16:creationId xmlns:a16="http://schemas.microsoft.com/office/drawing/2014/main" id="{D1F9E424-DFBD-498C-BB46-9FF0973931A5}"/>
+                </a:ext>
+              </a:extLst>
+            </p:cNvPr>
+            <p:cNvCxnSpPr>
+              <a:cxnSpLocks/>
+            </p:cNvCxnSpPr>
+            <p:nvPr/>
+          </p:nvCxnSpPr>
+          <p:spPr>
+            <a:xfrm>
+              <a:off x="5138613" y="1218481"/>
+              <a:ext cx="1791576" cy="0"/>
+            </a:xfrm>
+            <a:prstGeom prst="straightConnector1">
+              <a:avLst/>
+            </a:prstGeom>
+            <a:ln>
+              <a:tailEnd type="triangle"/>
+            </a:ln>
+          </p:spPr>
+          <p:style>
+            <a:lnRef idx="3">
+              <a:schemeClr val="accent5"/>
+            </a:lnRef>
+            <a:fillRef idx="0">
+              <a:schemeClr val="accent5"/>
+            </a:fillRef>
+            <a:effectRef idx="2">
+              <a:schemeClr val="accent5"/>
+            </a:effectRef>
+            <a:fontRef idx="minor">
+              <a:schemeClr val="tx1"/>
+            </a:fontRef>
+          </p:style>
+        </p:cxnSp>
+        <p:sp>
+          <p:nvSpPr>
+            <p:cNvPr id="65" name="文本框 64">
+              <a:extLst>
+                <a:ext uri="{FF2B5EF4-FFF2-40B4-BE49-F238E27FC236}">
+                  <a16:creationId xmlns:a16="http://schemas.microsoft.com/office/drawing/2014/main" id="{117E1EAC-265C-4D01-A150-89301D163E8B}"/>
+                </a:ext>
+              </a:extLst>
+            </p:cNvPr>
+            <p:cNvSpPr txBox="1"/>
+            <p:nvPr/>
+          </p:nvSpPr>
+          <p:spPr>
+            <a:xfrm>
+              <a:off x="5336112" y="889636"/>
+              <a:ext cx="1791576" cy="307777"/>
+            </a:xfrm>
+            <a:prstGeom prst="rect">
+              <a:avLst/>
+            </a:prstGeom>
+            <a:noFill/>
+          </p:spPr>
+          <p:txBody>
+            <a:bodyPr wrap="square" rtlCol="0">
+              <a:spAutoFit/>
+            </a:bodyPr>
+            <a:lstStyle/>
+            <a:p>
+              <a:r>
+                <a:rPr lang="en-US" altLang="zh-CN" sz="1400" dirty="0" err="1"/>
+                <a:t>workInProgress</a:t>
+              </a:r>
+              <a:endParaRPr lang="zh-CN" altLang="en-US" sz="1400" dirty="0"/>
+            </a:p>
+          </p:txBody>
+        </p:sp>
+      </p:grpSp>
+      <p:grpSp>
+        <p:nvGrpSpPr>
+          <p:cNvPr id="17" name="组合 16">
+            <a:extLst>
+              <a:ext uri="{FF2B5EF4-FFF2-40B4-BE49-F238E27FC236}">
+                <a16:creationId xmlns:a16="http://schemas.microsoft.com/office/drawing/2014/main" id="{DD0BCC1A-5B66-43A3-B94C-A1A17E00BB31}"/>
+              </a:ext>
+            </a:extLst>
+          </p:cNvPr>
+          <p:cNvGrpSpPr/>
+          <p:nvPr/>
+        </p:nvGrpSpPr>
+        <p:grpSpPr>
+          <a:xfrm>
+            <a:off x="7355049" y="2412727"/>
+            <a:ext cx="2183587" cy="1045148"/>
+            <a:chOff x="6441907" y="2397573"/>
+            <a:chExt cx="2183587" cy="1045148"/>
+          </a:xfrm>
+        </p:grpSpPr>
+        <p:sp>
+          <p:nvSpPr>
+            <p:cNvPr id="2" name="文本框 1">
+              <a:extLst>
+                <a:ext uri="{FF2B5EF4-FFF2-40B4-BE49-F238E27FC236}">
+                  <a16:creationId xmlns:a16="http://schemas.microsoft.com/office/drawing/2014/main" id="{8A101089-31B4-4AB4-8D20-0DE6B30C5907}"/>
+                </a:ext>
+              </a:extLst>
+            </p:cNvPr>
+            <p:cNvSpPr txBox="1"/>
+            <p:nvPr/>
+          </p:nvSpPr>
+          <p:spPr>
+            <a:xfrm flipH="1">
+              <a:off x="6442249" y="2748125"/>
+              <a:ext cx="2183245" cy="307777"/>
+            </a:xfrm>
+            <a:prstGeom prst="rect">
+              <a:avLst/>
+            </a:prstGeom>
+            <a:noFill/>
+          </p:spPr>
+          <p:txBody>
+            <a:bodyPr wrap="square" rtlCol="0">
+              <a:spAutoFit/>
+            </a:bodyPr>
+            <a:lstStyle/>
+            <a:p>
+              <a:r>
+                <a:rPr lang="en-US" altLang="zh-CN" sz="1400" dirty="0"/>
+                <a:t>current</a:t>
+              </a:r>
+              <a:r>
+                <a:rPr lang="zh-CN" altLang="en-US" sz="1400" dirty="0"/>
+                <a:t>节点 </a:t>
+              </a:r>
+              <a:r>
+                <a:rPr lang="en-US" altLang="zh-CN" sz="1400" dirty="0"/>
+                <a:t>= APP</a:t>
+              </a:r>
+              <a:endParaRPr lang="zh-CN" altLang="en-US" sz="1400" dirty="0"/>
+            </a:p>
+          </p:txBody>
+        </p:sp>
+        <p:sp>
+          <p:nvSpPr>
+            <p:cNvPr id="3" name="文本框 2">
+              <a:extLst>
+                <a:ext uri="{FF2B5EF4-FFF2-40B4-BE49-F238E27FC236}">
+                  <a16:creationId xmlns:a16="http://schemas.microsoft.com/office/drawing/2014/main" id="{37CECD1D-65D9-4CA8-B8F3-B5A1BBC2BEAF}"/>
+                </a:ext>
+              </a:extLst>
+            </p:cNvPr>
+            <p:cNvSpPr txBox="1"/>
+            <p:nvPr/>
+          </p:nvSpPr>
+          <p:spPr>
+            <a:xfrm flipH="1">
+              <a:off x="6441908" y="2397573"/>
+              <a:ext cx="2183245" cy="307777"/>
+            </a:xfrm>
+            <a:prstGeom prst="rect">
+              <a:avLst/>
+            </a:prstGeom>
+            <a:noFill/>
+          </p:spPr>
+          <p:txBody>
+            <a:bodyPr wrap="square" rtlCol="0">
+              <a:spAutoFit/>
+            </a:bodyPr>
+            <a:lstStyle/>
+            <a:p>
+              <a:r>
+                <a:rPr lang="en-US" altLang="zh-CN" sz="1400" dirty="0"/>
+                <a:t>WIP</a:t>
+              </a:r>
+              <a:r>
+                <a:rPr lang="zh-CN" altLang="en-US" sz="1400" dirty="0"/>
+                <a:t>节点</a:t>
+              </a:r>
+              <a:r>
+                <a:rPr lang="en-US" altLang="zh-CN" sz="1400" dirty="0"/>
+                <a:t>= </a:t>
+              </a:r>
+              <a:r>
+                <a:rPr lang="en-US" altLang="zh-CN" sz="1400" dirty="0" err="1"/>
+                <a:t>WIP:App</a:t>
+              </a:r>
+              <a:endParaRPr lang="zh-CN" altLang="en-US" sz="1400" dirty="0"/>
+            </a:p>
+          </p:txBody>
+        </p:sp>
+        <p:sp>
+          <p:nvSpPr>
+            <p:cNvPr id="4" name="文本框 3">
+              <a:extLst>
+                <a:ext uri="{FF2B5EF4-FFF2-40B4-BE49-F238E27FC236}">
+                  <a16:creationId xmlns:a16="http://schemas.microsoft.com/office/drawing/2014/main" id="{F48574AE-0BA3-4C2A-9263-0F9E23290808}"/>
+                </a:ext>
+              </a:extLst>
+            </p:cNvPr>
+            <p:cNvSpPr txBox="1"/>
+            <p:nvPr/>
+          </p:nvSpPr>
+          <p:spPr>
+            <a:xfrm flipH="1">
+              <a:off x="6441907" y="3134944"/>
+              <a:ext cx="2183245" cy="307777"/>
+            </a:xfrm>
+            <a:prstGeom prst="rect">
+              <a:avLst/>
+            </a:prstGeom>
+            <a:noFill/>
+          </p:spPr>
+          <p:txBody>
+            <a:bodyPr wrap="square" rtlCol="0">
+              <a:spAutoFit/>
+            </a:bodyPr>
+            <a:lstStyle/>
+            <a:p>
+              <a:r>
+                <a:rPr lang="en-US" altLang="zh-CN" sz="1400" dirty="0" err="1"/>
+                <a:t>renderLanes</a:t>
+              </a:r>
+              <a:r>
+                <a:rPr lang="en-US" altLang="zh-CN" sz="1400" dirty="0"/>
+                <a:t> = 2</a:t>
+              </a:r>
+              <a:endParaRPr lang="zh-CN" altLang="en-US" sz="1400" dirty="0"/>
+            </a:p>
+          </p:txBody>
+        </p:sp>
+      </p:grpSp>
+      <p:sp>
+        <p:nvSpPr>
+          <p:cNvPr id="20" name="右大括号 19">
+            <a:extLst>
+              <a:ext uri="{FF2B5EF4-FFF2-40B4-BE49-F238E27FC236}">
+                <a16:creationId xmlns:a16="http://schemas.microsoft.com/office/drawing/2014/main" id="{2B3F44A0-5588-4A7D-AB2F-85DB8EAA1F21}"/>
+              </a:ext>
+            </a:extLst>
+          </p:cNvPr>
+          <p:cNvSpPr/>
+          <p:nvPr/>
+        </p:nvSpPr>
+        <p:spPr>
+          <a:xfrm>
+            <a:off x="9098806" y="2409433"/>
+            <a:ext cx="175035" cy="1094160"/>
+          </a:xfrm>
+          <a:prstGeom prst="rightBrace">
+            <a:avLst>
+              <a:gd name="adj1" fmla="val 8333"/>
+              <a:gd name="adj2" fmla="val 48093"/>
+            </a:avLst>
+          </a:prstGeom>
+        </p:spPr>
+        <p:style>
+          <a:lnRef idx="3">
+            <a:schemeClr val="accent6"/>
+          </a:lnRef>
+          <a:fillRef idx="0">
+            <a:schemeClr val="accent6"/>
+          </a:fillRef>
+          <a:effectRef idx="2">
+            <a:schemeClr val="accent6"/>
+          </a:effectRef>
+          <a:fontRef idx="minor">
+            <a:schemeClr val="tx1"/>
+          </a:fontRef>
+        </p:style>
+        <p:txBody>
+          <a:bodyPr rtlCol="0" anchor="ctr"/>
+          <a:lstStyle/>
+          <a:p>
+            <a:pPr algn="ctr"/>
+            <a:endParaRPr lang="zh-CN" altLang="en-US" dirty="0"/>
+          </a:p>
+        </p:txBody>
+      </p:sp>
+      <p:sp>
+        <p:nvSpPr>
+          <p:cNvPr id="22" name="矩形: 圆角 21">
+            <a:extLst>
+              <a:ext uri="{FF2B5EF4-FFF2-40B4-BE49-F238E27FC236}">
+                <a16:creationId xmlns:a16="http://schemas.microsoft.com/office/drawing/2014/main" id="{DA4B9584-7229-444A-91D0-81D591E25B4F}"/>
+              </a:ext>
+            </a:extLst>
+          </p:cNvPr>
+          <p:cNvSpPr/>
+          <p:nvPr/>
+        </p:nvSpPr>
+        <p:spPr>
+          <a:xfrm>
+            <a:off x="9489548" y="2534389"/>
+            <a:ext cx="1473636" cy="760113"/>
+          </a:xfrm>
+          <a:prstGeom prst="roundRect">
+            <a:avLst/>
+          </a:prstGeom>
+        </p:spPr>
+        <p:style>
+          <a:lnRef idx="1">
+            <a:schemeClr val="accent6"/>
+          </a:lnRef>
+          <a:fillRef idx="2">
+            <a:schemeClr val="accent6"/>
+          </a:fillRef>
+          <a:effectRef idx="1">
+            <a:schemeClr val="accent6"/>
+          </a:effectRef>
+          <a:fontRef idx="minor">
+            <a:schemeClr val="dk1"/>
+          </a:fontRef>
+        </p:style>
+        <p:txBody>
+          <a:bodyPr rtlCol="0" anchor="ctr"/>
+          <a:lstStyle/>
+          <a:p>
+            <a:pPr algn="ctr"/>
+            <a:r>
+              <a:rPr lang="en-US" altLang="zh-CN" dirty="0" err="1"/>
+              <a:t>beginWork</a:t>
+            </a:r>
+            <a:endParaRPr lang="zh-CN" altLang="en-US" dirty="0"/>
+          </a:p>
+        </p:txBody>
+      </p:sp>
+      <p:sp>
+        <p:nvSpPr>
+          <p:cNvPr id="54" name="矩形: 圆角 53">
+            <a:extLst>
+              <a:ext uri="{FF2B5EF4-FFF2-40B4-BE49-F238E27FC236}">
+                <a16:creationId xmlns:a16="http://schemas.microsoft.com/office/drawing/2014/main" id="{57C00A85-056A-465D-8404-BD62DC1316DF}"/>
+              </a:ext>
+            </a:extLst>
+          </p:cNvPr>
+          <p:cNvSpPr/>
+          <p:nvPr/>
+        </p:nvSpPr>
+        <p:spPr>
+          <a:xfrm>
+            <a:off x="5670951" y="2633235"/>
+            <a:ext cx="1526797" cy="578840"/>
+          </a:xfrm>
+          <a:prstGeom prst="roundRect">
+            <a:avLst/>
+          </a:prstGeom>
+        </p:spPr>
+        <p:style>
+          <a:lnRef idx="1">
+            <a:schemeClr val="accent6"/>
+          </a:lnRef>
+          <a:fillRef idx="2">
+            <a:schemeClr val="accent6"/>
+          </a:fillRef>
+          <a:effectRef idx="1">
+            <a:schemeClr val="accent6"/>
+          </a:effectRef>
+          <a:fontRef idx="minor">
+            <a:schemeClr val="dk1"/>
+          </a:fontRef>
+        </p:style>
+        <p:txBody>
+          <a:bodyPr rtlCol="0" anchor="ctr"/>
+          <a:lstStyle/>
+          <a:p>
+            <a:pPr algn="ctr"/>
+            <a:r>
+              <a:rPr lang="en-US" altLang="zh-CN" dirty="0"/>
+              <a:t>WIP:APP</a:t>
+            </a:r>
+            <a:endParaRPr lang="zh-CN" altLang="en-US" dirty="0"/>
+          </a:p>
+        </p:txBody>
+      </p:sp>
+      <p:sp>
+        <p:nvSpPr>
+          <p:cNvPr id="52" name="矩形: 圆角 51">
+            <a:extLst>
+              <a:ext uri="{FF2B5EF4-FFF2-40B4-BE49-F238E27FC236}">
+                <a16:creationId xmlns:a16="http://schemas.microsoft.com/office/drawing/2014/main" id="{98198E00-44EC-49A6-825A-FCAE1764C790}"/>
+              </a:ext>
+            </a:extLst>
+          </p:cNvPr>
+          <p:cNvSpPr/>
+          <p:nvPr/>
+        </p:nvSpPr>
+        <p:spPr>
+          <a:xfrm>
+            <a:off x="5668643" y="2630726"/>
+            <a:ext cx="1526797" cy="578840"/>
+          </a:xfrm>
+          <a:prstGeom prst="roundRect">
+            <a:avLst/>
+          </a:prstGeom>
+        </p:spPr>
+        <p:style>
+          <a:lnRef idx="1">
+            <a:schemeClr val="accent5"/>
+          </a:lnRef>
+          <a:fillRef idx="2">
+            <a:schemeClr val="accent5"/>
+          </a:fillRef>
+          <a:effectRef idx="1">
+            <a:schemeClr val="accent5"/>
+          </a:effectRef>
+          <a:fontRef idx="minor">
+            <a:schemeClr val="dk1"/>
+          </a:fontRef>
+        </p:style>
+        <p:txBody>
+          <a:bodyPr rtlCol="0" anchor="ctr"/>
+          <a:lstStyle/>
+          <a:p>
+            <a:pPr algn="ctr"/>
+            <a:r>
+              <a:rPr lang="en-US" altLang="zh-CN" dirty="0" err="1"/>
+              <a:t>WIP:APPNew</a:t>
+            </a:r>
+            <a:endParaRPr lang="zh-CN" altLang="en-US" dirty="0"/>
+          </a:p>
+        </p:txBody>
+      </p:sp>
+      <p:cxnSp>
+        <p:nvCxnSpPr>
+          <p:cNvPr id="41" name="连接符: 肘形 40">
+            <a:extLst>
+              <a:ext uri="{FF2B5EF4-FFF2-40B4-BE49-F238E27FC236}">
+                <a16:creationId xmlns:a16="http://schemas.microsoft.com/office/drawing/2014/main" id="{AA64886A-8D24-4419-9E30-D325A5F2D60D}"/>
+              </a:ext>
+            </a:extLst>
+          </p:cNvPr>
+          <p:cNvCxnSpPr>
+            <a:stCxn id="22" idx="0"/>
+          </p:cNvCxnSpPr>
+          <p:nvPr/>
+        </p:nvCxnSpPr>
+        <p:spPr>
+          <a:xfrm rot="16200000" flipH="1" flipV="1">
+            <a:off x="8562165" y="902414"/>
+            <a:ext cx="32226" cy="3296176"/>
+          </a:xfrm>
+          <a:prstGeom prst="bentConnector4">
+            <a:avLst>
+              <a:gd name="adj1" fmla="val -2381971"/>
+              <a:gd name="adj2" fmla="val 100015"/>
+            </a:avLst>
+          </a:prstGeom>
+          <a:ln>
+            <a:tailEnd type="triangle"/>
+          </a:ln>
+        </p:spPr>
+        <p:style>
+          <a:lnRef idx="3">
+            <a:schemeClr val="accent6"/>
+          </a:lnRef>
+          <a:fillRef idx="0">
+            <a:schemeClr val="accent6"/>
+          </a:fillRef>
+          <a:effectRef idx="2">
+            <a:schemeClr val="accent6"/>
+          </a:effectRef>
+          <a:fontRef idx="minor">
+            <a:schemeClr val="tx1"/>
+          </a:fontRef>
+        </p:style>
+      </p:cxnSp>
+      <p:sp>
+        <p:nvSpPr>
+          <p:cNvPr id="45" name="文本框 44">
+            <a:extLst>
+              <a:ext uri="{FF2B5EF4-FFF2-40B4-BE49-F238E27FC236}">
+                <a16:creationId xmlns:a16="http://schemas.microsoft.com/office/drawing/2014/main" id="{3E0B3253-F1EA-49AC-AEAA-CD0D1C4651C9}"/>
+              </a:ext>
+            </a:extLst>
+          </p:cNvPr>
+          <p:cNvSpPr txBox="1"/>
+          <p:nvPr/>
+        </p:nvSpPr>
+        <p:spPr>
+          <a:xfrm flipH="1">
+            <a:off x="7195440" y="1362712"/>
+            <a:ext cx="2631968" cy="307777"/>
+          </a:xfrm>
+          <a:prstGeom prst="rect">
+            <a:avLst/>
+          </a:prstGeom>
+          <a:noFill/>
+        </p:spPr>
+        <p:txBody>
+          <a:bodyPr wrap="square" rtlCol="0">
+            <a:spAutoFit/>
+          </a:bodyPr>
+          <a:lstStyle/>
+          <a:p>
+            <a:r>
+              <a:rPr lang="zh-CN" altLang="en-US" sz="1400" dirty="0"/>
+              <a:t>计算新</a:t>
+            </a:r>
+            <a:r>
+              <a:rPr lang="en-US" altLang="zh-CN" sz="1400" dirty="0"/>
+              <a:t>state </a:t>
+            </a:r>
+            <a:r>
+              <a:rPr lang="zh-CN" altLang="en-US" sz="1400" dirty="0"/>
+              <a:t>、</a:t>
+            </a:r>
+            <a:r>
+              <a:rPr lang="en-US" altLang="zh-CN" sz="1400" dirty="0"/>
+              <a:t>diff</a:t>
+            </a:r>
+            <a:r>
+              <a:rPr lang="zh-CN" altLang="en-US" sz="1400" dirty="0"/>
+              <a:t>、</a:t>
+            </a:r>
+            <a:r>
+              <a:rPr lang="en-US" altLang="zh-CN" sz="1400" dirty="0" err="1"/>
+              <a:t>effectTag</a:t>
+            </a:r>
+            <a:endParaRPr lang="zh-CN" altLang="en-US" sz="1400" dirty="0"/>
+          </a:p>
+        </p:txBody>
+      </p:sp>
+      <p:sp>
+        <p:nvSpPr>
+          <p:cNvPr id="67" name="文本框 66">
+            <a:extLst>
+              <a:ext uri="{FF2B5EF4-FFF2-40B4-BE49-F238E27FC236}">
+                <a16:creationId xmlns:a16="http://schemas.microsoft.com/office/drawing/2014/main" id="{24DCC027-65D1-4CF8-A0CD-BC60CAF56D28}"/>
+              </a:ext>
+            </a:extLst>
+          </p:cNvPr>
+          <p:cNvSpPr txBox="1"/>
+          <p:nvPr/>
+        </p:nvSpPr>
+        <p:spPr>
+          <a:xfrm flipH="1">
+            <a:off x="7693829" y="4212633"/>
+            <a:ext cx="2532536" cy="307777"/>
+          </a:xfrm>
+          <a:prstGeom prst="rect">
+            <a:avLst/>
+          </a:prstGeom>
+          <a:noFill/>
+        </p:spPr>
+        <p:txBody>
+          <a:bodyPr wrap="square" rtlCol="0">
+            <a:spAutoFit/>
+          </a:bodyPr>
+          <a:lstStyle/>
+          <a:p>
+            <a:r>
+              <a:rPr lang="zh-CN" altLang="en-US" sz="1400" dirty="0"/>
+              <a:t>返回</a:t>
+            </a:r>
+            <a:r>
+              <a:rPr lang="en-US" altLang="zh-CN" sz="1400" dirty="0"/>
+              <a:t>App</a:t>
+            </a:r>
+            <a:r>
+              <a:rPr lang="zh-CN" altLang="en-US" sz="1400" dirty="0"/>
+              <a:t>  </a:t>
+            </a:r>
+            <a:r>
+              <a:rPr lang="en-US" altLang="zh-CN" sz="1400" dirty="0"/>
+              <a:t>fiber</a:t>
+            </a:r>
+            <a:r>
+              <a:rPr lang="zh-CN" altLang="en-US" sz="1400" dirty="0"/>
+              <a:t>节点的子节点</a:t>
+            </a:r>
+          </a:p>
+        </p:txBody>
+      </p:sp>
+      <p:cxnSp>
+        <p:nvCxnSpPr>
+          <p:cNvPr id="47" name="连接符: 肘形 46">
+            <a:extLst>
+              <a:ext uri="{FF2B5EF4-FFF2-40B4-BE49-F238E27FC236}">
+                <a16:creationId xmlns:a16="http://schemas.microsoft.com/office/drawing/2014/main" id="{BFE4C291-2A65-49D4-8F4B-DF105B3551C3}"/>
+              </a:ext>
+            </a:extLst>
+          </p:cNvPr>
+          <p:cNvCxnSpPr>
+            <a:stCxn id="22" idx="2"/>
+            <a:endCxn id="72" idx="3"/>
+          </p:cNvCxnSpPr>
+          <p:nvPr/>
+        </p:nvCxnSpPr>
+        <p:spPr>
+          <a:xfrm rot="5400000">
+            <a:off x="8047269" y="2409195"/>
+            <a:ext cx="1293791" cy="3064405"/>
+          </a:xfrm>
+          <a:prstGeom prst="bentConnector2">
+            <a:avLst/>
+          </a:prstGeom>
+          <a:ln>
+            <a:tailEnd type="triangle"/>
+          </a:ln>
+        </p:spPr>
+        <p:style>
+          <a:lnRef idx="3">
+            <a:schemeClr val="accent6"/>
+          </a:lnRef>
+          <a:fillRef idx="0">
+            <a:schemeClr val="accent6"/>
+          </a:fillRef>
+          <a:effectRef idx="2">
+            <a:schemeClr val="accent6"/>
+          </a:effectRef>
+          <a:fontRef idx="minor">
+            <a:schemeClr val="tx1"/>
+          </a:fontRef>
+        </p:style>
+      </p:cxnSp>
+    </p:spTree>
+    <p:extLst>
+      <p:ext uri="{BB962C8B-B14F-4D97-AF65-F5344CB8AC3E}">
+        <p14:creationId xmlns:p14="http://schemas.microsoft.com/office/powerpoint/2010/main" val="2217342211"/>
+      </p:ext>
+    </p:extLst>
+  </p:cSld>
+  <p:clrMapOvr>
+    <a:masterClrMapping/>
+  </p:clrMapOvr>
+  <p:timing>
+    <p:tnLst>
+      <p:par>
+        <p:cTn id="1" dur="indefinite" restart="never" nodeType="tmRoot">
+          <p:childTnLst>
+            <p:seq concurrent="1" nextAc="seek">
+              <p:cTn id="2" dur="indefinite" nodeType="mainSeq">
+                <p:childTnLst>
+                  <p:par>
+                    <p:cTn id="3" fill="hold">
+                      <p:stCondLst>
+                        <p:cond delay="indefinite"/>
+                      </p:stCondLst>
+                      <p:childTnLst>
+                        <p:par>
+                          <p:cTn id="4" fill="hold">
+                            <p:stCondLst>
+                              <p:cond delay="0"/>
+                            </p:stCondLst>
+                            <p:childTnLst>
+                              <p:par>
+                                <p:cTn id="5" presetID="42" presetClass="entr" presetSubtype="0" fill="hold" grpId="0" nodeType="clickEffect">
+                                  <p:stCondLst>
+                                    <p:cond delay="0"/>
+                                  </p:stCondLst>
+                                  <p:childTnLst>
+                                    <p:set>
+                                      <p:cBhvr>
+                                        <p:cTn id="6" dur="1" fill="hold">
+                                          <p:stCondLst>
+                                            <p:cond delay="0"/>
+                                          </p:stCondLst>
+                                        </p:cTn>
+                                        <p:tgtEl>
+                                          <p:spTgt spid="51"/>
+                                        </p:tgtEl>
+                                        <p:attrNameLst>
+                                          <p:attrName>style.visibility</p:attrName>
+                                        </p:attrNameLst>
+                                      </p:cBhvr>
+                                      <p:to>
+                                        <p:strVal val="visible"/>
+                                      </p:to>
+                                    </p:set>
+                                    <p:animEffect transition="in" filter="fade">
+                                      <p:cBhvr>
+                                        <p:cTn id="7" dur="1000"/>
+                                        <p:tgtEl>
+                                          <p:spTgt spid="51"/>
+                                        </p:tgtEl>
+                                      </p:cBhvr>
+                                    </p:animEffect>
+                                    <p:anim calcmode="lin" valueType="num">
+                                      <p:cBhvr>
+                                        <p:cTn id="8" dur="1000" fill="hold"/>
+                                        <p:tgtEl>
+                                          <p:spTgt spid="51"/>
+                                        </p:tgtEl>
+                                        <p:attrNameLst>
+                                          <p:attrName>ppt_x</p:attrName>
+                                        </p:attrNameLst>
+                                      </p:cBhvr>
+                                      <p:tavLst>
+                                        <p:tav tm="0">
+                                          <p:val>
+                                            <p:strVal val="#ppt_x"/>
+                                          </p:val>
+                                        </p:tav>
+                                        <p:tav tm="100000">
+                                          <p:val>
+                                            <p:strVal val="#ppt_x"/>
+                                          </p:val>
+                                        </p:tav>
+                                      </p:tavLst>
+                                    </p:anim>
+                                    <p:anim calcmode="lin" valueType="num">
+                                      <p:cBhvr>
+                                        <p:cTn id="9" dur="1000" fill="hold"/>
+                                        <p:tgtEl>
+                                          <p:spTgt spid="51"/>
+                                        </p:tgtEl>
+                                        <p:attrNameLst>
+                                          <p:attrName>ppt_y</p:attrName>
+                                        </p:attrNameLst>
+                                      </p:cBhvr>
+                                      <p:tavLst>
+                                        <p:tav tm="0">
+                                          <p:val>
+                                            <p:strVal val="#ppt_y+.1"/>
+                                          </p:val>
+                                        </p:tav>
+                                        <p:tav tm="100000">
+                                          <p:val>
+                                            <p:strVal val="#ppt_y"/>
+                                          </p:val>
+                                        </p:tav>
+                                      </p:tavLst>
+                                    </p:anim>
+                                  </p:childTnLst>
+                                </p:cTn>
+                              </p:par>
+                            </p:childTnLst>
+                          </p:cTn>
+                        </p:par>
+                        <p:par>
+                          <p:cTn id="10" fill="hold">
+                            <p:stCondLst>
+                              <p:cond delay="1000"/>
+                            </p:stCondLst>
+                            <p:childTnLst>
+                              <p:par>
+                                <p:cTn id="11" presetID="2" presetClass="entr" presetSubtype="1" fill="hold" grpId="0" nodeType="afterEffect">
+                                  <p:stCondLst>
+                                    <p:cond delay="0"/>
+                                  </p:stCondLst>
+                                  <p:childTnLst>
+                                    <p:set>
+                                      <p:cBhvr>
+                                        <p:cTn id="12" dur="1" fill="hold">
+                                          <p:stCondLst>
+                                            <p:cond delay="0"/>
+                                          </p:stCondLst>
+                                        </p:cTn>
+                                        <p:tgtEl>
+                                          <p:spTgt spid="96"/>
+                                        </p:tgtEl>
+                                        <p:attrNameLst>
+                                          <p:attrName>style.visibility</p:attrName>
+                                        </p:attrNameLst>
+                                      </p:cBhvr>
+                                      <p:to>
+                                        <p:strVal val="visible"/>
+                                      </p:to>
+                                    </p:set>
+                                    <p:anim calcmode="lin" valueType="num">
+                                      <p:cBhvr additive="base">
+                                        <p:cTn id="13" dur="500" fill="hold"/>
+                                        <p:tgtEl>
+                                          <p:spTgt spid="96"/>
+                                        </p:tgtEl>
+                                        <p:attrNameLst>
+                                          <p:attrName>ppt_x</p:attrName>
+                                        </p:attrNameLst>
+                                      </p:cBhvr>
+                                      <p:tavLst>
+                                        <p:tav tm="0">
+                                          <p:val>
+                                            <p:strVal val="#ppt_x"/>
+                                          </p:val>
+                                        </p:tav>
+                                        <p:tav tm="100000">
+                                          <p:val>
+                                            <p:strVal val="#ppt_x"/>
+                                          </p:val>
+                                        </p:tav>
+                                      </p:tavLst>
+                                    </p:anim>
+                                    <p:anim calcmode="lin" valueType="num">
+                                      <p:cBhvr additive="base">
+                                        <p:cTn id="14" dur="500" fill="hold"/>
+                                        <p:tgtEl>
+                                          <p:spTgt spid="96"/>
+                                        </p:tgtEl>
+                                        <p:attrNameLst>
+                                          <p:attrName>ppt_y</p:attrName>
+                                        </p:attrNameLst>
+                                      </p:cBhvr>
+                                      <p:tavLst>
+                                        <p:tav tm="0">
+                                          <p:val>
+                                            <p:strVal val="0-#ppt_h/2"/>
+                                          </p:val>
+                                        </p:tav>
+                                        <p:tav tm="100000">
+                                          <p:val>
+                                            <p:strVal val="#ppt_y"/>
+                                          </p:val>
+                                        </p:tav>
+                                      </p:tavLst>
+                                    </p:anim>
+                                  </p:childTnLst>
+                                </p:cTn>
+                              </p:par>
+                            </p:childTnLst>
+                          </p:cTn>
+                        </p:par>
+                        <p:par>
+                          <p:cTn id="15" fill="hold">
+                            <p:stCondLst>
+                              <p:cond delay="1500"/>
+                            </p:stCondLst>
+                            <p:childTnLst>
+                              <p:par>
+                                <p:cTn id="16" presetID="22" presetClass="entr" presetSubtype="8" fill="hold" nodeType="afterEffect">
+                                  <p:stCondLst>
+                                    <p:cond delay="0"/>
+                                  </p:stCondLst>
+                                  <p:childTnLst>
+                                    <p:set>
+                                      <p:cBhvr>
+                                        <p:cTn id="17" dur="1" fill="hold">
+                                          <p:stCondLst>
+                                            <p:cond delay="0"/>
+                                          </p:stCondLst>
+                                        </p:cTn>
+                                        <p:tgtEl>
+                                          <p:spTgt spid="34"/>
+                                        </p:tgtEl>
+                                        <p:attrNameLst>
+                                          <p:attrName>style.visibility</p:attrName>
+                                        </p:attrNameLst>
+                                      </p:cBhvr>
+                                      <p:to>
+                                        <p:strVal val="visible"/>
+                                      </p:to>
+                                    </p:set>
+                                    <p:animEffect transition="in" filter="wipe(left)">
+                                      <p:cBhvr>
+                                        <p:cTn id="18" dur="500"/>
+                                        <p:tgtEl>
+                                          <p:spTgt spid="34"/>
+                                        </p:tgtEl>
+                                      </p:cBhvr>
+                                    </p:animEffect>
+                                  </p:childTnLst>
+                                </p:cTn>
+                              </p:par>
+                            </p:childTnLst>
+                          </p:cTn>
+                        </p:par>
+                        <p:par>
+                          <p:cTn id="19" fill="hold">
+                            <p:stCondLst>
+                              <p:cond delay="2000"/>
+                            </p:stCondLst>
+                            <p:childTnLst>
+                              <p:par>
+                                <p:cTn id="20" presetID="10" presetClass="entr" presetSubtype="0" fill="hold" grpId="0" nodeType="afterEffect">
+                                  <p:stCondLst>
+                                    <p:cond delay="0"/>
+                                  </p:stCondLst>
+                                  <p:childTnLst>
+                                    <p:set>
+                                      <p:cBhvr>
+                                        <p:cTn id="21" dur="1" fill="hold">
+                                          <p:stCondLst>
+                                            <p:cond delay="0"/>
+                                          </p:stCondLst>
+                                        </p:cTn>
+                                        <p:tgtEl>
+                                          <p:spTgt spid="50"/>
+                                        </p:tgtEl>
+                                        <p:attrNameLst>
+                                          <p:attrName>style.visibility</p:attrName>
+                                        </p:attrNameLst>
+                                      </p:cBhvr>
+                                      <p:to>
+                                        <p:strVal val="visible"/>
+                                      </p:to>
+                                    </p:set>
+                                    <p:animEffect transition="in" filter="fade">
+                                      <p:cBhvr>
+                                        <p:cTn id="22" dur="750"/>
+                                        <p:tgtEl>
+                                          <p:spTgt spid="50"/>
+                                        </p:tgtEl>
+                                      </p:cBhvr>
+                                    </p:animEffect>
+                                  </p:childTnLst>
+                                </p:cTn>
+                              </p:par>
+                            </p:childTnLst>
+                          </p:cTn>
+                        </p:par>
+                        <p:par>
+                          <p:cTn id="23" fill="hold">
+                            <p:stCondLst>
+                              <p:cond delay="2750"/>
+                            </p:stCondLst>
+                            <p:childTnLst>
+                              <p:par>
+                                <p:cTn id="24" presetID="22" presetClass="entr" presetSubtype="1" fill="hold" nodeType="afterEffect">
+                                  <p:stCondLst>
+                                    <p:cond delay="0"/>
+                                  </p:stCondLst>
+                                  <p:childTnLst>
+                                    <p:set>
+                                      <p:cBhvr>
+                                        <p:cTn id="25" dur="1" fill="hold">
+                                          <p:stCondLst>
+                                            <p:cond delay="0"/>
+                                          </p:stCondLst>
+                                        </p:cTn>
+                                        <p:tgtEl>
+                                          <p:spTgt spid="68"/>
+                                        </p:tgtEl>
+                                        <p:attrNameLst>
+                                          <p:attrName>style.visibility</p:attrName>
+                                        </p:attrNameLst>
+                                      </p:cBhvr>
+                                      <p:to>
+                                        <p:strVal val="visible"/>
+                                      </p:to>
+                                    </p:set>
+                                    <p:animEffect transition="in" filter="wipe(up)">
+                                      <p:cBhvr>
+                                        <p:cTn id="26" dur="750"/>
+                                        <p:tgtEl>
+                                          <p:spTgt spid="68"/>
+                                        </p:tgtEl>
+                                      </p:cBhvr>
+                                    </p:animEffect>
+                                  </p:childTnLst>
+                                </p:cTn>
+                              </p:par>
+                              <p:par>
+                                <p:cTn id="27" presetID="42" presetClass="path" presetSubtype="0" accel="50000" decel="50000" fill="hold" nodeType="withEffect">
+                                  <p:stCondLst>
+                                    <p:cond delay="0"/>
+                                  </p:stCondLst>
+                                  <p:childTnLst>
+                                    <p:animMotion origin="layout" path="M -2.08333E-6 -4.07407E-6 L -2.08333E-6 0.25 " pathEditMode="relative" rAng="0" ptsTypes="AA">
+                                      <p:cBhvr>
+                                        <p:cTn id="28" dur="1000" fill="hold"/>
+                                        <p:tgtEl>
+                                          <p:spTgt spid="34"/>
+                                        </p:tgtEl>
+                                        <p:attrNameLst>
+                                          <p:attrName>ppt_x</p:attrName>
+                                          <p:attrName>ppt_y</p:attrName>
+                                        </p:attrNameLst>
+                                      </p:cBhvr>
+                                      <p:rCtr x="0" y="12500"/>
+                                    </p:animMotion>
+                                  </p:childTnLst>
+                                </p:cTn>
+                              </p:par>
+                            </p:childTnLst>
+                          </p:cTn>
+                        </p:par>
+                        <p:par>
+                          <p:cTn id="29" fill="hold">
+                            <p:stCondLst>
+                              <p:cond delay="3750"/>
+                            </p:stCondLst>
+                            <p:childTnLst>
+                              <p:par>
+                                <p:cTn id="30" presetID="10" presetClass="entr" presetSubtype="0" fill="hold" grpId="0" nodeType="afterEffect">
+                                  <p:stCondLst>
+                                    <p:cond delay="0"/>
+                                  </p:stCondLst>
+                                  <p:childTnLst>
+                                    <p:set>
+                                      <p:cBhvr>
+                                        <p:cTn id="31" dur="1" fill="hold">
+                                          <p:stCondLst>
+                                            <p:cond delay="0"/>
+                                          </p:stCondLst>
+                                        </p:cTn>
+                                        <p:tgtEl>
+                                          <p:spTgt spid="62"/>
+                                        </p:tgtEl>
+                                        <p:attrNameLst>
+                                          <p:attrName>style.visibility</p:attrName>
+                                        </p:attrNameLst>
+                                      </p:cBhvr>
+                                      <p:to>
+                                        <p:strVal val="visible"/>
+                                      </p:to>
+                                    </p:set>
+                                    <p:animEffect transition="in" filter="fade">
+                                      <p:cBhvr>
+                                        <p:cTn id="32" dur="500"/>
+                                        <p:tgtEl>
+                                          <p:spTgt spid="62"/>
+                                        </p:tgtEl>
+                                      </p:cBhvr>
+                                    </p:animEffect>
+                                  </p:childTnLst>
+                                </p:cTn>
+                              </p:par>
+                            </p:childTnLst>
+                          </p:cTn>
+                        </p:par>
+                        <p:par>
+                          <p:cTn id="33" fill="hold">
+                            <p:stCondLst>
+                              <p:cond delay="4250"/>
+                            </p:stCondLst>
+                            <p:childTnLst>
+                              <p:par>
+                                <p:cTn id="34" presetID="10" presetClass="entr" presetSubtype="0" fill="hold" grpId="0" nodeType="afterEffect">
+                                  <p:stCondLst>
+                                    <p:cond delay="0"/>
+                                  </p:stCondLst>
+                                  <p:childTnLst>
+                                    <p:set>
+                                      <p:cBhvr>
+                                        <p:cTn id="35" dur="1" fill="hold">
+                                          <p:stCondLst>
+                                            <p:cond delay="0"/>
+                                          </p:stCondLst>
+                                        </p:cTn>
+                                        <p:tgtEl>
+                                          <p:spTgt spid="54"/>
+                                        </p:tgtEl>
+                                        <p:attrNameLst>
+                                          <p:attrName>style.visibility</p:attrName>
+                                        </p:attrNameLst>
+                                      </p:cBhvr>
+                                      <p:to>
+                                        <p:strVal val="visible"/>
+                                      </p:to>
+                                    </p:set>
+                                    <p:animEffect transition="in" filter="fade">
+                                      <p:cBhvr>
+                                        <p:cTn id="36" dur="500"/>
+                                        <p:tgtEl>
+                                          <p:spTgt spid="54"/>
+                                        </p:tgtEl>
+                                      </p:cBhvr>
+                                    </p:animEffect>
+                                  </p:childTnLst>
+                                </p:cTn>
+                              </p:par>
+                              <p:par>
+                                <p:cTn id="37" presetID="27" presetClass="emph" presetSubtype="0" fill="remove" grpId="1" nodeType="withEffect">
+                                  <p:stCondLst>
+                                    <p:cond delay="0"/>
+                                  </p:stCondLst>
+                                  <p:childTnLst>
+                                    <p:animClr clrSpc="rgb" dir="cw">
+                                      <p:cBhvr override="childStyle">
+                                        <p:cTn id="38" dur="250" autoRev="1" fill="remove"/>
+                                        <p:tgtEl>
+                                          <p:spTgt spid="54"/>
+                                        </p:tgtEl>
+                                        <p:attrNameLst>
+                                          <p:attrName>style.color</p:attrName>
+                                        </p:attrNameLst>
+                                      </p:cBhvr>
+                                      <p:to>
+                                        <a:schemeClr val="bg1"/>
+                                      </p:to>
+                                    </p:animClr>
+                                    <p:animClr clrSpc="rgb" dir="cw">
+                                      <p:cBhvr>
+                                        <p:cTn id="39" dur="250" autoRev="1" fill="remove"/>
+                                        <p:tgtEl>
+                                          <p:spTgt spid="54"/>
+                                        </p:tgtEl>
+                                        <p:attrNameLst>
+                                          <p:attrName>fillcolor</p:attrName>
+                                        </p:attrNameLst>
+                                      </p:cBhvr>
+                                      <p:to>
+                                        <a:schemeClr val="bg1"/>
+                                      </p:to>
+                                    </p:animClr>
+                                    <p:set>
+                                      <p:cBhvr>
+                                        <p:cTn id="40" dur="250" autoRev="1" fill="remove"/>
+                                        <p:tgtEl>
+                                          <p:spTgt spid="54"/>
+                                        </p:tgtEl>
+                                        <p:attrNameLst>
+                                          <p:attrName>fill.type</p:attrName>
+                                        </p:attrNameLst>
+                                      </p:cBhvr>
+                                      <p:to>
+                                        <p:strVal val="solid"/>
+                                      </p:to>
+                                    </p:set>
+                                    <p:set>
+                                      <p:cBhvr>
+                                        <p:cTn id="41" dur="250" autoRev="1" fill="remove"/>
+                                        <p:tgtEl>
+                                          <p:spTgt spid="54"/>
+                                        </p:tgtEl>
+                                        <p:attrNameLst>
+                                          <p:attrName>fill.on</p:attrName>
+                                        </p:attrNameLst>
+                                      </p:cBhvr>
+                                      <p:to>
+                                        <p:strVal val="true"/>
+                                      </p:to>
+                                    </p:set>
+                                  </p:childTnLst>
+                                </p:cTn>
+                              </p:par>
+                            </p:childTnLst>
+                          </p:cTn>
+                        </p:par>
+                        <p:par>
+                          <p:cTn id="42" fill="hold">
+                            <p:stCondLst>
+                              <p:cond delay="4750"/>
+                            </p:stCondLst>
+                            <p:childTnLst>
+                              <p:par>
+                                <p:cTn id="43" presetID="10" presetClass="entr" presetSubtype="0" fill="hold" nodeType="afterEffect">
+                                  <p:stCondLst>
+                                    <p:cond delay="0"/>
+                                  </p:stCondLst>
+                                  <p:childTnLst>
+                                    <p:set>
+                                      <p:cBhvr>
+                                        <p:cTn id="44" dur="1" fill="hold">
+                                          <p:stCondLst>
+                                            <p:cond delay="0"/>
+                                          </p:stCondLst>
+                                        </p:cTn>
+                                        <p:tgtEl>
+                                          <p:spTgt spid="17"/>
+                                        </p:tgtEl>
+                                        <p:attrNameLst>
+                                          <p:attrName>style.visibility</p:attrName>
+                                        </p:attrNameLst>
+                                      </p:cBhvr>
+                                      <p:to>
+                                        <p:strVal val="visible"/>
+                                      </p:to>
+                                    </p:set>
+                                    <p:animEffect transition="in" filter="fade">
+                                      <p:cBhvr>
+                                        <p:cTn id="45" dur="500"/>
+                                        <p:tgtEl>
+                                          <p:spTgt spid="17"/>
+                                        </p:tgtEl>
+                                      </p:cBhvr>
+                                    </p:animEffect>
+                                  </p:childTnLst>
+                                </p:cTn>
+                              </p:par>
+                              <p:par>
+                                <p:cTn id="46" presetID="10" presetClass="entr" presetSubtype="0" fill="hold" grpId="0" nodeType="withEffect">
+                                  <p:stCondLst>
+                                    <p:cond delay="0"/>
+                                  </p:stCondLst>
+                                  <p:childTnLst>
+                                    <p:set>
+                                      <p:cBhvr>
+                                        <p:cTn id="47" dur="1" fill="hold">
+                                          <p:stCondLst>
+                                            <p:cond delay="0"/>
+                                          </p:stCondLst>
+                                        </p:cTn>
+                                        <p:tgtEl>
+                                          <p:spTgt spid="20"/>
+                                        </p:tgtEl>
+                                        <p:attrNameLst>
+                                          <p:attrName>style.visibility</p:attrName>
+                                        </p:attrNameLst>
+                                      </p:cBhvr>
+                                      <p:to>
+                                        <p:strVal val="visible"/>
+                                      </p:to>
+                                    </p:set>
+                                    <p:animEffect transition="in" filter="fade">
+                                      <p:cBhvr>
+                                        <p:cTn id="48" dur="500"/>
+                                        <p:tgtEl>
+                                          <p:spTgt spid="20"/>
+                                        </p:tgtEl>
+                                      </p:cBhvr>
+                                    </p:animEffect>
+                                  </p:childTnLst>
+                                </p:cTn>
+                              </p:par>
+                            </p:childTnLst>
+                          </p:cTn>
+                        </p:par>
+                        <p:par>
+                          <p:cTn id="49" fill="hold">
+                            <p:stCondLst>
+                              <p:cond delay="5250"/>
+                            </p:stCondLst>
+                            <p:childTnLst>
+                              <p:par>
+                                <p:cTn id="50" presetID="10" presetClass="entr" presetSubtype="0" fill="hold" grpId="0" nodeType="afterEffect">
+                                  <p:stCondLst>
+                                    <p:cond delay="0"/>
+                                  </p:stCondLst>
+                                  <p:childTnLst>
+                                    <p:set>
+                                      <p:cBhvr>
+                                        <p:cTn id="51" dur="1" fill="hold">
+                                          <p:stCondLst>
+                                            <p:cond delay="0"/>
+                                          </p:stCondLst>
+                                        </p:cTn>
+                                        <p:tgtEl>
+                                          <p:spTgt spid="22"/>
+                                        </p:tgtEl>
+                                        <p:attrNameLst>
+                                          <p:attrName>style.visibility</p:attrName>
+                                        </p:attrNameLst>
+                                      </p:cBhvr>
+                                      <p:to>
+                                        <p:strVal val="visible"/>
+                                      </p:to>
+                                    </p:set>
+                                    <p:animEffect transition="in" filter="fade">
+                                      <p:cBhvr>
+                                        <p:cTn id="52" dur="500"/>
+                                        <p:tgtEl>
+                                          <p:spTgt spid="22"/>
+                                        </p:tgtEl>
+                                      </p:cBhvr>
+                                    </p:animEffect>
+                                  </p:childTnLst>
+                                </p:cTn>
+                              </p:par>
+                              <p:par>
+                                <p:cTn id="53" presetID="27" presetClass="emph" presetSubtype="0" fill="remove" grpId="1" nodeType="withEffect">
+                                  <p:stCondLst>
+                                    <p:cond delay="0"/>
+                                  </p:stCondLst>
+                                  <p:childTnLst>
+                                    <p:animClr clrSpc="rgb" dir="cw">
+                                      <p:cBhvr override="childStyle">
+                                        <p:cTn id="54" dur="250" autoRev="1" fill="remove"/>
+                                        <p:tgtEl>
+                                          <p:spTgt spid="22"/>
+                                        </p:tgtEl>
+                                        <p:attrNameLst>
+                                          <p:attrName>style.color</p:attrName>
+                                        </p:attrNameLst>
+                                      </p:cBhvr>
+                                      <p:to>
+                                        <a:schemeClr val="bg1"/>
+                                      </p:to>
+                                    </p:animClr>
+                                    <p:animClr clrSpc="rgb" dir="cw">
+                                      <p:cBhvr>
+                                        <p:cTn id="55" dur="250" autoRev="1" fill="remove"/>
+                                        <p:tgtEl>
+                                          <p:spTgt spid="22"/>
+                                        </p:tgtEl>
+                                        <p:attrNameLst>
+                                          <p:attrName>fillcolor</p:attrName>
+                                        </p:attrNameLst>
+                                      </p:cBhvr>
+                                      <p:to>
+                                        <a:schemeClr val="bg1"/>
+                                      </p:to>
+                                    </p:animClr>
+                                    <p:set>
+                                      <p:cBhvr>
+                                        <p:cTn id="56" dur="250" autoRev="1" fill="remove"/>
+                                        <p:tgtEl>
+                                          <p:spTgt spid="22"/>
+                                        </p:tgtEl>
+                                        <p:attrNameLst>
+                                          <p:attrName>fill.type</p:attrName>
+                                        </p:attrNameLst>
+                                      </p:cBhvr>
+                                      <p:to>
+                                        <p:strVal val="solid"/>
+                                      </p:to>
+                                    </p:set>
+                                    <p:set>
+                                      <p:cBhvr>
+                                        <p:cTn id="57" dur="250" autoRev="1" fill="remove"/>
+                                        <p:tgtEl>
+                                          <p:spTgt spid="22"/>
+                                        </p:tgtEl>
+                                        <p:attrNameLst>
+                                          <p:attrName>fill.on</p:attrName>
+                                        </p:attrNameLst>
+                                      </p:cBhvr>
+                                      <p:to>
+                                        <p:strVal val="true"/>
+                                      </p:to>
+                                    </p:set>
+                                  </p:childTnLst>
+                                </p:cTn>
+                              </p:par>
+                            </p:childTnLst>
+                          </p:cTn>
+                        </p:par>
+                        <p:par>
+                          <p:cTn id="58" fill="hold">
+                            <p:stCondLst>
+                              <p:cond delay="5750"/>
+                            </p:stCondLst>
+                            <p:childTnLst>
+                              <p:par>
+                                <p:cTn id="59" presetID="10" presetClass="entr" presetSubtype="0" fill="hold" nodeType="afterEffect">
+                                  <p:stCondLst>
+                                    <p:cond delay="0"/>
+                                  </p:stCondLst>
+                                  <p:childTnLst>
+                                    <p:set>
+                                      <p:cBhvr>
+                                        <p:cTn id="60" dur="1" fill="hold">
+                                          <p:stCondLst>
+                                            <p:cond delay="0"/>
+                                          </p:stCondLst>
+                                        </p:cTn>
+                                        <p:tgtEl>
+                                          <p:spTgt spid="41"/>
+                                        </p:tgtEl>
+                                        <p:attrNameLst>
+                                          <p:attrName>style.visibility</p:attrName>
+                                        </p:attrNameLst>
+                                      </p:cBhvr>
+                                      <p:to>
+                                        <p:strVal val="visible"/>
+                                      </p:to>
+                                    </p:set>
+                                    <p:animEffect transition="in" filter="fade">
+                                      <p:cBhvr>
+                                        <p:cTn id="61" dur="500"/>
+                                        <p:tgtEl>
+                                          <p:spTgt spid="41"/>
+                                        </p:tgtEl>
+                                      </p:cBhvr>
+                                    </p:animEffect>
+                                  </p:childTnLst>
+                                </p:cTn>
+                              </p:par>
+                              <p:par>
+                                <p:cTn id="62" presetID="10" presetClass="entr" presetSubtype="0" fill="hold" grpId="0" nodeType="withEffect">
+                                  <p:stCondLst>
+                                    <p:cond delay="0"/>
+                                  </p:stCondLst>
+                                  <p:childTnLst>
+                                    <p:set>
+                                      <p:cBhvr>
+                                        <p:cTn id="63" dur="1" fill="hold">
+                                          <p:stCondLst>
+                                            <p:cond delay="0"/>
+                                          </p:stCondLst>
+                                        </p:cTn>
+                                        <p:tgtEl>
+                                          <p:spTgt spid="45"/>
+                                        </p:tgtEl>
+                                        <p:attrNameLst>
+                                          <p:attrName>style.visibility</p:attrName>
+                                        </p:attrNameLst>
+                                      </p:cBhvr>
+                                      <p:to>
+                                        <p:strVal val="visible"/>
+                                      </p:to>
+                                    </p:set>
+                                    <p:animEffect transition="in" filter="fade">
+                                      <p:cBhvr>
+                                        <p:cTn id="64" dur="500"/>
+                                        <p:tgtEl>
+                                          <p:spTgt spid="45"/>
+                                        </p:tgtEl>
+                                      </p:cBhvr>
+                                    </p:animEffect>
+                                  </p:childTnLst>
+                                </p:cTn>
+                              </p:par>
+                            </p:childTnLst>
+                          </p:cTn>
+                        </p:par>
+                        <p:par>
+                          <p:cTn id="65" fill="hold">
+                            <p:stCondLst>
+                              <p:cond delay="6250"/>
+                            </p:stCondLst>
+                            <p:childTnLst>
+                              <p:par>
+                                <p:cTn id="66" presetID="10" presetClass="entr" presetSubtype="0" fill="hold" grpId="0" nodeType="afterEffect">
+                                  <p:stCondLst>
+                                    <p:cond delay="0"/>
+                                  </p:stCondLst>
+                                  <p:childTnLst>
+                                    <p:set>
+                                      <p:cBhvr>
+                                        <p:cTn id="67" dur="1" fill="hold">
+                                          <p:stCondLst>
+                                            <p:cond delay="0"/>
+                                          </p:stCondLst>
+                                        </p:cTn>
+                                        <p:tgtEl>
+                                          <p:spTgt spid="52"/>
+                                        </p:tgtEl>
+                                        <p:attrNameLst>
+                                          <p:attrName>style.visibility</p:attrName>
+                                        </p:attrNameLst>
+                                      </p:cBhvr>
+                                      <p:to>
+                                        <p:strVal val="visible"/>
+                                      </p:to>
+                                    </p:set>
+                                    <p:animEffect transition="in" filter="fade">
+                                      <p:cBhvr>
+                                        <p:cTn id="68" dur="500"/>
+                                        <p:tgtEl>
+                                          <p:spTgt spid="52"/>
+                                        </p:tgtEl>
+                                      </p:cBhvr>
+                                    </p:animEffect>
+                                  </p:childTnLst>
+                                </p:cTn>
+                              </p:par>
+                            </p:childTnLst>
+                          </p:cTn>
+                        </p:par>
+                        <p:par>
+                          <p:cTn id="69" fill="hold">
+                            <p:stCondLst>
+                              <p:cond delay="6750"/>
+                            </p:stCondLst>
+                            <p:childTnLst>
+                              <p:par>
+                                <p:cTn id="70" presetID="27" presetClass="emph" presetSubtype="0" fill="remove" grpId="1" nodeType="afterEffect">
+                                  <p:stCondLst>
+                                    <p:cond delay="0"/>
+                                  </p:stCondLst>
+                                  <p:childTnLst>
+                                    <p:animClr clrSpc="rgb" dir="cw">
+                                      <p:cBhvr override="childStyle">
+                                        <p:cTn id="71" dur="250" autoRev="1" fill="remove"/>
+                                        <p:tgtEl>
+                                          <p:spTgt spid="52"/>
+                                        </p:tgtEl>
+                                        <p:attrNameLst>
+                                          <p:attrName>style.color</p:attrName>
+                                        </p:attrNameLst>
+                                      </p:cBhvr>
+                                      <p:to>
+                                        <a:schemeClr val="bg1"/>
+                                      </p:to>
+                                    </p:animClr>
+                                    <p:animClr clrSpc="rgb" dir="cw">
+                                      <p:cBhvr>
+                                        <p:cTn id="72" dur="250" autoRev="1" fill="remove"/>
+                                        <p:tgtEl>
+                                          <p:spTgt spid="52"/>
+                                        </p:tgtEl>
+                                        <p:attrNameLst>
+                                          <p:attrName>fillcolor</p:attrName>
+                                        </p:attrNameLst>
+                                      </p:cBhvr>
+                                      <p:to>
+                                        <a:schemeClr val="bg1"/>
+                                      </p:to>
+                                    </p:animClr>
+                                    <p:set>
+                                      <p:cBhvr>
+                                        <p:cTn id="73" dur="250" autoRev="1" fill="remove"/>
+                                        <p:tgtEl>
+                                          <p:spTgt spid="52"/>
+                                        </p:tgtEl>
+                                        <p:attrNameLst>
+                                          <p:attrName>fill.type</p:attrName>
+                                        </p:attrNameLst>
+                                      </p:cBhvr>
+                                      <p:to>
+                                        <p:strVal val="solid"/>
+                                      </p:to>
+                                    </p:set>
+                                    <p:set>
+                                      <p:cBhvr>
+                                        <p:cTn id="74" dur="250" autoRev="1" fill="remove"/>
+                                        <p:tgtEl>
+                                          <p:spTgt spid="52"/>
+                                        </p:tgtEl>
+                                        <p:attrNameLst>
+                                          <p:attrName>fill.on</p:attrName>
+                                        </p:attrNameLst>
+                                      </p:cBhvr>
+                                      <p:to>
+                                        <p:strVal val="true"/>
+                                      </p:to>
+                                    </p:set>
+                                  </p:childTnLst>
+                                </p:cTn>
+                              </p:par>
+                            </p:childTnLst>
+                          </p:cTn>
+                        </p:par>
+                        <p:par>
+                          <p:cTn id="75" fill="hold">
+                            <p:stCondLst>
+                              <p:cond delay="7250"/>
+                            </p:stCondLst>
+                            <p:childTnLst>
+                              <p:par>
+                                <p:cTn id="76" presetID="10" presetClass="entr" presetSubtype="0" fill="hold" nodeType="afterEffect">
+                                  <p:stCondLst>
+                                    <p:cond delay="0"/>
+                                  </p:stCondLst>
+                                  <p:childTnLst>
+                                    <p:set>
+                                      <p:cBhvr>
+                                        <p:cTn id="77" dur="1" fill="hold">
+                                          <p:stCondLst>
+                                            <p:cond delay="0"/>
+                                          </p:stCondLst>
+                                        </p:cTn>
+                                        <p:tgtEl>
+                                          <p:spTgt spid="47"/>
+                                        </p:tgtEl>
+                                        <p:attrNameLst>
+                                          <p:attrName>style.visibility</p:attrName>
+                                        </p:attrNameLst>
+                                      </p:cBhvr>
+                                      <p:to>
+                                        <p:strVal val="visible"/>
+                                      </p:to>
+                                    </p:set>
+                                    <p:animEffect transition="in" filter="fade">
+                                      <p:cBhvr>
+                                        <p:cTn id="78" dur="500"/>
+                                        <p:tgtEl>
+                                          <p:spTgt spid="47"/>
+                                        </p:tgtEl>
+                                      </p:cBhvr>
+                                    </p:animEffect>
+                                  </p:childTnLst>
+                                </p:cTn>
+                              </p:par>
+                            </p:childTnLst>
+                          </p:cTn>
+                        </p:par>
+                        <p:par>
+                          <p:cTn id="79" fill="hold">
+                            <p:stCondLst>
+                              <p:cond delay="7750"/>
+                            </p:stCondLst>
+                            <p:childTnLst>
+                              <p:par>
+                                <p:cTn id="80" presetID="10" presetClass="entr" presetSubtype="0" fill="hold" grpId="0" nodeType="afterEffect">
+                                  <p:stCondLst>
+                                    <p:cond delay="0"/>
+                                  </p:stCondLst>
+                                  <p:childTnLst>
+                                    <p:set>
+                                      <p:cBhvr>
+                                        <p:cTn id="81" dur="1" fill="hold">
+                                          <p:stCondLst>
+                                            <p:cond delay="0"/>
+                                          </p:stCondLst>
+                                        </p:cTn>
+                                        <p:tgtEl>
+                                          <p:spTgt spid="67"/>
+                                        </p:tgtEl>
+                                        <p:attrNameLst>
+                                          <p:attrName>style.visibility</p:attrName>
+                                        </p:attrNameLst>
+                                      </p:cBhvr>
+                                      <p:to>
+                                        <p:strVal val="visible"/>
+                                      </p:to>
+                                    </p:set>
+                                    <p:animEffect transition="in" filter="fade">
+                                      <p:cBhvr>
+                                        <p:cTn id="82" dur="500"/>
+                                        <p:tgtEl>
+                                          <p:spTgt spid="67"/>
+                                        </p:tgtEl>
+                                      </p:cBhvr>
+                                    </p:animEffect>
+                                  </p:childTnLst>
+                                </p:cTn>
+                              </p:par>
+                            </p:childTnLst>
+                          </p:cTn>
+                        </p:par>
+                        <p:par>
+                          <p:cTn id="83" fill="hold">
+                            <p:stCondLst>
+                              <p:cond delay="8250"/>
+                            </p:stCondLst>
+                            <p:childTnLst>
+                              <p:par>
+                                <p:cTn id="84" presetID="22" presetClass="entr" presetSubtype="1" fill="hold" nodeType="afterEffect">
+                                  <p:stCondLst>
+                                    <p:cond delay="0"/>
+                                  </p:stCondLst>
+                                  <p:childTnLst>
+                                    <p:set>
+                                      <p:cBhvr>
+                                        <p:cTn id="85" dur="1" fill="hold">
+                                          <p:stCondLst>
+                                            <p:cond delay="0"/>
+                                          </p:stCondLst>
+                                        </p:cTn>
+                                        <p:tgtEl>
+                                          <p:spTgt spid="69"/>
+                                        </p:tgtEl>
+                                        <p:attrNameLst>
+                                          <p:attrName>style.visibility</p:attrName>
+                                        </p:attrNameLst>
+                                      </p:cBhvr>
+                                      <p:to>
+                                        <p:strVal val="visible"/>
+                                      </p:to>
+                                    </p:set>
+                                    <p:animEffect transition="in" filter="wipe(up)">
+                                      <p:cBhvr>
+                                        <p:cTn id="86" dur="750"/>
+                                        <p:tgtEl>
+                                          <p:spTgt spid="69"/>
+                                        </p:tgtEl>
+                                      </p:cBhvr>
+                                    </p:animEffect>
+                                  </p:childTnLst>
+                                </p:cTn>
+                              </p:par>
+                              <p:par>
+                                <p:cTn id="87" presetID="42" presetClass="path" presetSubtype="0" accel="50000" decel="50000" fill="hold" nodeType="withEffect">
+                                  <p:stCondLst>
+                                    <p:cond delay="0"/>
+                                  </p:stCondLst>
+                                  <p:childTnLst>
+                                    <p:animMotion origin="layout" path="M -2.08333E-6 0.25 L -2.08333E-6 0.48774 " pathEditMode="relative" rAng="0" ptsTypes="AA">
+                                      <p:cBhvr>
+                                        <p:cTn id="88" dur="1000" fill="hold"/>
+                                        <p:tgtEl>
+                                          <p:spTgt spid="34"/>
+                                        </p:tgtEl>
+                                        <p:attrNameLst>
+                                          <p:attrName>ppt_x</p:attrName>
+                                          <p:attrName>ppt_y</p:attrName>
+                                        </p:attrNameLst>
+                                      </p:cBhvr>
+                                      <p:rCtr x="0" y="11875"/>
+                                    </p:animMotion>
+                                  </p:childTnLst>
+                                </p:cTn>
+                              </p:par>
+                            </p:childTnLst>
+                          </p:cTn>
+                        </p:par>
+                        <p:par>
+                          <p:cTn id="89" fill="hold">
+                            <p:stCondLst>
+                              <p:cond delay="9250"/>
+                            </p:stCondLst>
+                            <p:childTnLst>
+                              <p:par>
+                                <p:cTn id="90" presetID="10" presetClass="entr" presetSubtype="0" fill="hold" grpId="0" nodeType="afterEffect">
+                                  <p:stCondLst>
+                                    <p:cond delay="0"/>
+                                  </p:stCondLst>
+                                  <p:childTnLst>
+                                    <p:set>
+                                      <p:cBhvr>
+                                        <p:cTn id="91" dur="1" fill="hold">
+                                          <p:stCondLst>
+                                            <p:cond delay="0"/>
+                                          </p:stCondLst>
+                                        </p:cTn>
+                                        <p:tgtEl>
+                                          <p:spTgt spid="72"/>
+                                        </p:tgtEl>
+                                        <p:attrNameLst>
+                                          <p:attrName>style.visibility</p:attrName>
+                                        </p:attrNameLst>
+                                      </p:cBhvr>
+                                      <p:to>
+                                        <p:strVal val="visible"/>
+                                      </p:to>
+                                    </p:set>
+                                    <p:animEffect transition="in" filter="fade">
+                                      <p:cBhvr>
+                                        <p:cTn id="92" dur="500"/>
+                                        <p:tgtEl>
+                                          <p:spTgt spid="72"/>
+                                        </p:tgtEl>
+                                      </p:cBhvr>
+                                    </p:animEffect>
+                                  </p:childTnLst>
+                                </p:cTn>
+                              </p:par>
+                            </p:childTnLst>
+                          </p:cTn>
+                        </p:par>
+                        <p:par>
+                          <p:cTn id="93" fill="hold">
+                            <p:stCondLst>
+                              <p:cond delay="9750"/>
+                            </p:stCondLst>
+                            <p:childTnLst>
+                              <p:par>
+                                <p:cTn id="94" presetID="22" presetClass="entr" presetSubtype="1" fill="hold" nodeType="afterEffect">
+                                  <p:stCondLst>
+                                    <p:cond delay="0"/>
+                                  </p:stCondLst>
+                                  <p:childTnLst>
+                                    <p:set>
+                                      <p:cBhvr>
+                                        <p:cTn id="95" dur="1" fill="hold">
+                                          <p:stCondLst>
+                                            <p:cond delay="0"/>
+                                          </p:stCondLst>
+                                        </p:cTn>
+                                        <p:tgtEl>
+                                          <p:spTgt spid="79"/>
+                                        </p:tgtEl>
+                                        <p:attrNameLst>
+                                          <p:attrName>style.visibility</p:attrName>
+                                        </p:attrNameLst>
+                                      </p:cBhvr>
+                                      <p:to>
+                                        <p:strVal val="visible"/>
+                                      </p:to>
+                                    </p:set>
+                                    <p:animEffect transition="in" filter="wipe(up)">
+                                      <p:cBhvr>
+                                        <p:cTn id="96" dur="750"/>
+                                        <p:tgtEl>
+                                          <p:spTgt spid="79"/>
+                                        </p:tgtEl>
+                                      </p:cBhvr>
+                                    </p:animEffect>
+                                  </p:childTnLst>
+                                </p:cTn>
+                              </p:par>
+                              <p:par>
+                                <p:cTn id="97" presetID="42" presetClass="path" presetSubtype="0" accel="50000" decel="50000" fill="hold" nodeType="withEffect">
+                                  <p:stCondLst>
+                                    <p:cond delay="0"/>
+                                  </p:stCondLst>
+                                  <p:childTnLst>
+                                    <p:animMotion origin="layout" path="M -2.08333E-6 0.48774 L -2.08333E-6 0.72269 " pathEditMode="relative" rAng="0" ptsTypes="AA">
+                                      <p:cBhvr>
+                                        <p:cTn id="98" dur="1000" fill="hold"/>
+                                        <p:tgtEl>
+                                          <p:spTgt spid="34"/>
+                                        </p:tgtEl>
+                                        <p:attrNameLst>
+                                          <p:attrName>ppt_x</p:attrName>
+                                          <p:attrName>ppt_y</p:attrName>
+                                        </p:attrNameLst>
+                                      </p:cBhvr>
+                                      <p:rCtr x="0" y="11736"/>
+                                    </p:animMotion>
+                                  </p:childTnLst>
+                                </p:cTn>
+                              </p:par>
+                            </p:childTnLst>
+                          </p:cTn>
+                        </p:par>
+                        <p:par>
+                          <p:cTn id="99" fill="hold">
+                            <p:stCondLst>
+                              <p:cond delay="10750"/>
+                            </p:stCondLst>
+                            <p:childTnLst>
+                              <p:par>
+                                <p:cTn id="100" presetID="10" presetClass="entr" presetSubtype="0" fill="hold" grpId="0" nodeType="afterEffect">
+                                  <p:stCondLst>
+                                    <p:cond delay="0"/>
+                                  </p:stCondLst>
+                                  <p:childTnLst>
+                                    <p:set>
+                                      <p:cBhvr>
+                                        <p:cTn id="101" dur="1" fill="hold">
+                                          <p:stCondLst>
+                                            <p:cond delay="0"/>
+                                          </p:stCondLst>
+                                        </p:cTn>
+                                        <p:tgtEl>
+                                          <p:spTgt spid="82"/>
+                                        </p:tgtEl>
+                                        <p:attrNameLst>
+                                          <p:attrName>style.visibility</p:attrName>
+                                        </p:attrNameLst>
+                                      </p:cBhvr>
+                                      <p:to>
+                                        <p:strVal val="visible"/>
+                                      </p:to>
+                                    </p:set>
+                                    <p:animEffect transition="in" filter="fade">
+                                      <p:cBhvr>
+                                        <p:cTn id="102" dur="500"/>
+                                        <p:tgtEl>
+                                          <p:spTgt spid="82"/>
+                                        </p:tgtEl>
+                                      </p:cBhvr>
+                                    </p:animEffect>
+                                  </p:childTnLst>
+                                </p:cTn>
+                              </p:par>
+                            </p:childTnLst>
+                          </p:cTn>
+                        </p:par>
+                      </p:childTnLst>
+                    </p:cTn>
+                  </p:par>
+                </p:childTnLst>
+              </p:cTn>
+              <p:prevCondLst>
+                <p:cond evt="onPrev" delay="0">
+                  <p:tgtEl>
+                    <p:sldTgt/>
+                  </p:tgtEl>
+                </p:cond>
+              </p:prevCondLst>
+              <p:nextCondLst>
+                <p:cond evt="onNext" delay="0">
+                  <p:tgtEl>
+                    <p:sldTgt/>
+                  </p:tgtEl>
+                </p:cond>
+              </p:nextCondLst>
+            </p:seq>
+          </p:childTnLst>
+        </p:cTn>
+      </p:par>
+    </p:tnLst>
+    <p:bldLst>
+      <p:bldP spid="50" grpId="0" animBg="1"/>
+      <p:bldP spid="51" grpId="0"/>
+      <p:bldP spid="62" grpId="0" animBg="1"/>
+      <p:bldP spid="72" grpId="0" animBg="1"/>
+      <p:bldP spid="82" grpId="0" animBg="1"/>
+      <p:bldP spid="96" grpId="0"/>
+      <p:bldP spid="20" grpId="0" animBg="1"/>
+      <p:bldP spid="22" grpId="0" animBg="1"/>
+      <p:bldP spid="22" grpId="1" animBg="1"/>
+      <p:bldP spid="54" grpId="0" animBg="1"/>
+      <p:bldP spid="54" grpId="1" animBg="1"/>
+      <p:bldP spid="52" grpId="0" animBg="1"/>
+      <p:bldP spid="52" grpId="1" animBg="1"/>
+      <p:bldP spid="45" grpId="0"/>
+      <p:bldP spid="67" grpId="0"/>
     </p:bldLst>
   </p:timing>
 </p:sld>

</xml_diff>

<commit_message>
add: comments of lanes
</commit_message>
<xml_diff>
--- a/src/components/TasksWithDifferentPriorities/更新流程.pptx
+++ b/src/components/TasksWithDifferentPriorities/更新流程.pptx
@@ -261,7 +261,7 @@
           <a:p>
             <a:fld id="{630028CD-74F5-46B3-BF67-5601DA750C76}" type="datetimeFigureOut">
               <a:rPr lang="zh-CN" altLang="en-US" smtClean="0"/>
-              <a:t>2020/8/15 Saturday</a:t>
+              <a:t>2020/12/29 Tuesday</a:t>
             </a:fld>
             <a:endParaRPr lang="zh-CN" altLang="en-US"/>
           </a:p>
@@ -459,7 +459,7 @@
           <a:p>
             <a:fld id="{630028CD-74F5-46B3-BF67-5601DA750C76}" type="datetimeFigureOut">
               <a:rPr lang="zh-CN" altLang="en-US" smtClean="0"/>
-              <a:t>2020/8/15 Saturday</a:t>
+              <a:t>2020/12/29 Tuesday</a:t>
             </a:fld>
             <a:endParaRPr lang="zh-CN" altLang="en-US"/>
           </a:p>
@@ -667,7 +667,7 @@
           <a:p>
             <a:fld id="{630028CD-74F5-46B3-BF67-5601DA750C76}" type="datetimeFigureOut">
               <a:rPr lang="zh-CN" altLang="en-US" smtClean="0"/>
-              <a:t>2020/8/15 Saturday</a:t>
+              <a:t>2020/12/29 Tuesday</a:t>
             </a:fld>
             <a:endParaRPr lang="zh-CN" altLang="en-US"/>
           </a:p>
@@ -865,7 +865,7 @@
           <a:p>
             <a:fld id="{630028CD-74F5-46B3-BF67-5601DA750C76}" type="datetimeFigureOut">
               <a:rPr lang="zh-CN" altLang="en-US" smtClean="0"/>
-              <a:t>2020/8/15 Saturday</a:t>
+              <a:t>2020/12/29 Tuesday</a:t>
             </a:fld>
             <a:endParaRPr lang="zh-CN" altLang="en-US"/>
           </a:p>
@@ -1140,7 +1140,7 @@
           <a:p>
             <a:fld id="{630028CD-74F5-46B3-BF67-5601DA750C76}" type="datetimeFigureOut">
               <a:rPr lang="zh-CN" altLang="en-US" smtClean="0"/>
-              <a:t>2020/8/15 Saturday</a:t>
+              <a:t>2020/12/29 Tuesday</a:t>
             </a:fld>
             <a:endParaRPr lang="zh-CN" altLang="en-US"/>
           </a:p>
@@ -1405,7 +1405,7 @@
           <a:p>
             <a:fld id="{630028CD-74F5-46B3-BF67-5601DA750C76}" type="datetimeFigureOut">
               <a:rPr lang="zh-CN" altLang="en-US" smtClean="0"/>
-              <a:t>2020/8/15 Saturday</a:t>
+              <a:t>2020/12/29 Tuesday</a:t>
             </a:fld>
             <a:endParaRPr lang="zh-CN" altLang="en-US"/>
           </a:p>
@@ -1817,7 +1817,7 @@
           <a:p>
             <a:fld id="{630028CD-74F5-46B3-BF67-5601DA750C76}" type="datetimeFigureOut">
               <a:rPr lang="zh-CN" altLang="en-US" smtClean="0"/>
-              <a:t>2020/8/15 Saturday</a:t>
+              <a:t>2020/12/29 Tuesday</a:t>
             </a:fld>
             <a:endParaRPr lang="zh-CN" altLang="en-US"/>
           </a:p>
@@ -1958,7 +1958,7 @@
           <a:p>
             <a:fld id="{630028CD-74F5-46B3-BF67-5601DA750C76}" type="datetimeFigureOut">
               <a:rPr lang="zh-CN" altLang="en-US" smtClean="0"/>
-              <a:t>2020/8/15 Saturday</a:t>
+              <a:t>2020/12/29 Tuesday</a:t>
             </a:fld>
             <a:endParaRPr lang="zh-CN" altLang="en-US"/>
           </a:p>
@@ -2071,7 +2071,7 @@
           <a:p>
             <a:fld id="{630028CD-74F5-46B3-BF67-5601DA750C76}" type="datetimeFigureOut">
               <a:rPr lang="zh-CN" altLang="en-US" smtClean="0"/>
-              <a:t>2020/8/15 Saturday</a:t>
+              <a:t>2020/12/29 Tuesday</a:t>
             </a:fld>
             <a:endParaRPr lang="zh-CN" altLang="en-US"/>
           </a:p>
@@ -2382,7 +2382,7 @@
           <a:p>
             <a:fld id="{630028CD-74F5-46B3-BF67-5601DA750C76}" type="datetimeFigureOut">
               <a:rPr lang="zh-CN" altLang="en-US" smtClean="0"/>
-              <a:t>2020/8/15 Saturday</a:t>
+              <a:t>2020/12/29 Tuesday</a:t>
             </a:fld>
             <a:endParaRPr lang="zh-CN" altLang="en-US"/>
           </a:p>
@@ -2670,7 +2670,7 @@
           <a:p>
             <a:fld id="{630028CD-74F5-46B3-BF67-5601DA750C76}" type="datetimeFigureOut">
               <a:rPr lang="zh-CN" altLang="en-US" smtClean="0"/>
-              <a:t>2020/8/15 Saturday</a:t>
+              <a:t>2020/12/29 Tuesday</a:t>
             </a:fld>
             <a:endParaRPr lang="zh-CN" altLang="en-US"/>
           </a:p>
@@ -2911,7 +2911,7 @@
           <a:p>
             <a:fld id="{630028CD-74F5-46B3-BF67-5601DA750C76}" type="datetimeFigureOut">
               <a:rPr lang="zh-CN" altLang="en-US" smtClean="0"/>
-              <a:t>2020/8/15 Saturday</a:t>
+              <a:t>2020/12/29 Tuesday</a:t>
             </a:fld>
             <a:endParaRPr lang="zh-CN" altLang="en-US"/>
           </a:p>
@@ -11084,8 +11084,8 @@
         </p:nvSpPr>
         <p:spPr>
           <a:xfrm flipH="1">
-            <a:off x="7693829" y="4212633"/>
-            <a:ext cx="2532536" cy="307777"/>
+            <a:off x="7415868" y="4185762"/>
+            <a:ext cx="2810497" cy="307777"/>
           </a:xfrm>
           <a:prstGeom prst="rect">
             <a:avLst/>
@@ -11103,8 +11103,8 @@
               <a:t>返回</a:t>
             </a:r>
             <a:r>
-              <a:rPr lang="en-US" altLang="zh-CN" sz="1400" dirty="0"/>
-              <a:t>App</a:t>
+              <a:rPr lang="en-US" altLang="zh-CN" sz="1400" dirty="0" err="1"/>
+              <a:t>NewApp</a:t>
             </a:r>
             <a:r>
               <a:rPr lang="zh-CN" altLang="en-US" sz="1400" dirty="0"/>

</xml_diff>

<commit_message>
add: comments of starved task
</commit_message>
<xml_diff>
--- a/src/components/TasksWithDifferentPriorities/更新流程.pptx
+++ b/src/components/TasksWithDifferentPriorities/更新流程.pptx
@@ -261,7 +261,7 @@
           <a:p>
             <a:fld id="{630028CD-74F5-46B3-BF67-5601DA750C76}" type="datetimeFigureOut">
               <a:rPr lang="zh-CN" altLang="en-US" smtClean="0"/>
-              <a:t>2020/12/29 Tuesday</a:t>
+              <a:t>2021/1/9 Saturday</a:t>
             </a:fld>
             <a:endParaRPr lang="zh-CN" altLang="en-US"/>
           </a:p>
@@ -459,7 +459,7 @@
           <a:p>
             <a:fld id="{630028CD-74F5-46B3-BF67-5601DA750C76}" type="datetimeFigureOut">
               <a:rPr lang="zh-CN" altLang="en-US" smtClean="0"/>
-              <a:t>2020/12/29 Tuesday</a:t>
+              <a:t>2021/1/9 Saturday</a:t>
             </a:fld>
             <a:endParaRPr lang="zh-CN" altLang="en-US"/>
           </a:p>
@@ -667,7 +667,7 @@
           <a:p>
             <a:fld id="{630028CD-74F5-46B3-BF67-5601DA750C76}" type="datetimeFigureOut">
               <a:rPr lang="zh-CN" altLang="en-US" smtClean="0"/>
-              <a:t>2020/12/29 Tuesday</a:t>
+              <a:t>2021/1/9 Saturday</a:t>
             </a:fld>
             <a:endParaRPr lang="zh-CN" altLang="en-US"/>
           </a:p>
@@ -865,7 +865,7 @@
           <a:p>
             <a:fld id="{630028CD-74F5-46B3-BF67-5601DA750C76}" type="datetimeFigureOut">
               <a:rPr lang="zh-CN" altLang="en-US" smtClean="0"/>
-              <a:t>2020/12/29 Tuesday</a:t>
+              <a:t>2021/1/9 Saturday</a:t>
             </a:fld>
             <a:endParaRPr lang="zh-CN" altLang="en-US"/>
           </a:p>
@@ -1140,7 +1140,7 @@
           <a:p>
             <a:fld id="{630028CD-74F5-46B3-BF67-5601DA750C76}" type="datetimeFigureOut">
               <a:rPr lang="zh-CN" altLang="en-US" smtClean="0"/>
-              <a:t>2020/12/29 Tuesday</a:t>
+              <a:t>2021/1/9 Saturday</a:t>
             </a:fld>
             <a:endParaRPr lang="zh-CN" altLang="en-US"/>
           </a:p>
@@ -1405,7 +1405,7 @@
           <a:p>
             <a:fld id="{630028CD-74F5-46B3-BF67-5601DA750C76}" type="datetimeFigureOut">
               <a:rPr lang="zh-CN" altLang="en-US" smtClean="0"/>
-              <a:t>2020/12/29 Tuesday</a:t>
+              <a:t>2021/1/9 Saturday</a:t>
             </a:fld>
             <a:endParaRPr lang="zh-CN" altLang="en-US"/>
           </a:p>
@@ -1817,7 +1817,7 @@
           <a:p>
             <a:fld id="{630028CD-74F5-46B3-BF67-5601DA750C76}" type="datetimeFigureOut">
               <a:rPr lang="zh-CN" altLang="en-US" smtClean="0"/>
-              <a:t>2020/12/29 Tuesday</a:t>
+              <a:t>2021/1/9 Saturday</a:t>
             </a:fld>
             <a:endParaRPr lang="zh-CN" altLang="en-US"/>
           </a:p>
@@ -1958,7 +1958,7 @@
           <a:p>
             <a:fld id="{630028CD-74F5-46B3-BF67-5601DA750C76}" type="datetimeFigureOut">
               <a:rPr lang="zh-CN" altLang="en-US" smtClean="0"/>
-              <a:t>2020/12/29 Tuesday</a:t>
+              <a:t>2021/1/9 Saturday</a:t>
             </a:fld>
             <a:endParaRPr lang="zh-CN" altLang="en-US"/>
           </a:p>
@@ -2071,7 +2071,7 @@
           <a:p>
             <a:fld id="{630028CD-74F5-46B3-BF67-5601DA750C76}" type="datetimeFigureOut">
               <a:rPr lang="zh-CN" altLang="en-US" smtClean="0"/>
-              <a:t>2020/12/29 Tuesday</a:t>
+              <a:t>2021/1/9 Saturday</a:t>
             </a:fld>
             <a:endParaRPr lang="zh-CN" altLang="en-US"/>
           </a:p>
@@ -2382,7 +2382,7 @@
           <a:p>
             <a:fld id="{630028CD-74F5-46B3-BF67-5601DA750C76}" type="datetimeFigureOut">
               <a:rPr lang="zh-CN" altLang="en-US" smtClean="0"/>
-              <a:t>2020/12/29 Tuesday</a:t>
+              <a:t>2021/1/9 Saturday</a:t>
             </a:fld>
             <a:endParaRPr lang="zh-CN" altLang="en-US"/>
           </a:p>
@@ -2670,7 +2670,7 @@
           <a:p>
             <a:fld id="{630028CD-74F5-46B3-BF67-5601DA750C76}" type="datetimeFigureOut">
               <a:rPr lang="zh-CN" altLang="en-US" smtClean="0"/>
-              <a:t>2020/12/29 Tuesday</a:t>
+              <a:t>2021/1/9 Saturday</a:t>
             </a:fld>
             <a:endParaRPr lang="zh-CN" altLang="en-US"/>
           </a:p>
@@ -2911,7 +2911,7 @@
           <a:p>
             <a:fld id="{630028CD-74F5-46B3-BF67-5601DA750C76}" type="datetimeFigureOut">
               <a:rPr lang="zh-CN" altLang="en-US" smtClean="0"/>
-              <a:t>2020/12/29 Tuesday</a:t>
+              <a:t>2021/1/9 Saturday</a:t>
             </a:fld>
             <a:endParaRPr lang="zh-CN" altLang="en-US"/>
           </a:p>
@@ -3784,8 +3784,8 @@
         </p:nvSpPr>
         <p:spPr>
           <a:xfrm>
-            <a:off x="2010561" y="4110607"/>
-            <a:ext cx="1012260" cy="318782"/>
+            <a:off x="1831948" y="4103095"/>
+            <a:ext cx="1190873" cy="326294"/>
           </a:xfrm>
           <a:prstGeom prst="borderCallout1">
             <a:avLst>
@@ -3823,7 +3823,7 @@
                   <a:schemeClr val="tx1"/>
                 </a:solidFill>
               </a:rPr>
-              <a:t>Lanes:2</a:t>
+              <a:t>Lanes:0b001</a:t>
             </a:r>
             <a:endParaRPr lang="zh-CN" altLang="en-US" sz="1400" dirty="0">
               <a:solidFill>
@@ -3975,7 +3975,7 @@
                   <a:schemeClr val="tx1"/>
                 </a:solidFill>
               </a:rPr>
-              <a:t>childLanes:2</a:t>
+              <a:t>childLanes:0b001</a:t>
             </a:r>
             <a:endParaRPr lang="zh-CN" altLang="en-US" sz="1400" dirty="0">
               <a:solidFill>
@@ -4038,8 +4038,8 @@
         </p:nvSpPr>
         <p:spPr>
           <a:xfrm>
-            <a:off x="1489395" y="1208326"/>
-            <a:ext cx="1526797" cy="318782"/>
+            <a:off x="1173482" y="1208325"/>
+            <a:ext cx="1959429" cy="296595"/>
           </a:xfrm>
           <a:prstGeom prst="borderCallout1">
             <a:avLst>
@@ -4077,7 +4077,7 @@
                   <a:schemeClr val="tx1"/>
                 </a:solidFill>
               </a:rPr>
-              <a:t>root.childLanes:2</a:t>
+              <a:t>root.childLanes:0b001</a:t>
             </a:r>
             <a:endParaRPr lang="zh-CN" altLang="en-US" sz="1400" dirty="0">
               <a:solidFill>
@@ -4140,8 +4140,8 @@
         </p:nvSpPr>
         <p:spPr>
           <a:xfrm>
-            <a:off x="1276475" y="687541"/>
-            <a:ext cx="1754224" cy="318782"/>
+            <a:off x="1276475" y="687540"/>
+            <a:ext cx="1754224" cy="413489"/>
           </a:xfrm>
           <a:prstGeom prst="borderCallout1">
             <a:avLst>
@@ -4174,12 +4174,20 @@
           <a:p>
             <a:pPr algn="r"/>
             <a:r>
+              <a:rPr lang="en-US" altLang="zh-CN" sz="1400" dirty="0" err="1">
+                <a:solidFill>
+                  <a:schemeClr val="tx1"/>
+                </a:solidFill>
+              </a:rPr>
+              <a:t>root.pendingLanes</a:t>
+            </a:r>
+            <a:r>
               <a:rPr lang="en-US" altLang="zh-CN" sz="1400" dirty="0">
                 <a:solidFill>
                   <a:schemeClr val="tx1"/>
                 </a:solidFill>
               </a:rPr>
-              <a:t>root.pendingLanes:2</a:t>
+              <a:t>: 0b001</a:t>
             </a:r>
             <a:endParaRPr lang="zh-CN" altLang="en-US" sz="1400" dirty="0">
               <a:solidFill>
@@ -4206,12 +4214,12 @@
         </p:nvCxnSpPr>
         <p:spPr>
           <a:xfrm rot="16200000" flipV="1">
-            <a:off x="-153566" y="2276973"/>
-            <a:ext cx="3415554" cy="555472"/>
+            <a:off x="-129889" y="2300649"/>
+            <a:ext cx="3368202" cy="555473"/>
           </a:xfrm>
           <a:prstGeom prst="bentConnector4">
             <a:avLst>
-              <a:gd name="adj1" fmla="val -240"/>
+              <a:gd name="adj1" fmla="val 46931"/>
               <a:gd name="adj2" fmla="val 141154"/>
             </a:avLst>
           </a:prstGeom>
@@ -4815,8 +4823,8 @@
         </p:nvSpPr>
         <p:spPr>
           <a:xfrm>
-            <a:off x="5636532" y="4103095"/>
-            <a:ext cx="1012260" cy="318782"/>
+            <a:off x="5436064" y="4103095"/>
+            <a:ext cx="1212728" cy="318782"/>
           </a:xfrm>
           <a:prstGeom prst="borderCallout1">
             <a:avLst>
@@ -4854,7 +4862,7 @@
                   <a:schemeClr val="tx1"/>
                 </a:solidFill>
               </a:rPr>
-              <a:t>Lanes:0</a:t>
+              <a:t>Lanes: 0b001</a:t>
             </a:r>
             <a:endParaRPr lang="zh-CN" altLang="en-US" sz="1400" dirty="0">
               <a:solidFill>
@@ -5030,7 +5038,7 @@
         <p:spPr>
           <a:xfrm>
             <a:off x="9163573" y="4392515"/>
-            <a:ext cx="1526797" cy="318782"/>
+            <a:ext cx="1664447" cy="318782"/>
           </a:xfrm>
           <a:prstGeom prst="borderCallout1">
             <a:avLst>
@@ -5075,7 +5083,7 @@
                   <a:schemeClr val="tx1"/>
                 </a:solidFill>
               </a:rPr>
-              <a:t>: 0</a:t>
+              <a:t>: 0b000</a:t>
             </a:r>
             <a:endParaRPr lang="zh-CN" altLang="en-US" sz="1400" dirty="0">
               <a:solidFill>
@@ -5100,7 +5108,7 @@
         <p:spPr>
           <a:xfrm>
             <a:off x="9237152" y="2801227"/>
-            <a:ext cx="1526797" cy="318782"/>
+            <a:ext cx="1588141" cy="318782"/>
           </a:xfrm>
           <a:prstGeom prst="borderCallout1">
             <a:avLst>
@@ -5145,7 +5153,7 @@
                   <a:schemeClr val="tx1"/>
                 </a:solidFill>
               </a:rPr>
-              <a:t>: 0</a:t>
+              <a:t>: 0b000</a:t>
             </a:r>
             <a:endParaRPr lang="zh-CN" altLang="en-US" sz="1400" dirty="0">
               <a:solidFill>
@@ -5170,7 +5178,7 @@
         <p:spPr>
           <a:xfrm>
             <a:off x="9327384" y="1328335"/>
-            <a:ext cx="1588141" cy="318782"/>
+            <a:ext cx="1924543" cy="318782"/>
           </a:xfrm>
           <a:prstGeom prst="borderCallout1">
             <a:avLst>
@@ -5215,7 +5223,7 @@
                   <a:schemeClr val="tx1"/>
                 </a:solidFill>
               </a:rPr>
-              <a:t>: 0</a:t>
+              <a:t>: 0b000</a:t>
             </a:r>
             <a:endParaRPr lang="zh-CN" altLang="en-US" sz="1400" dirty="0">
               <a:solidFill>
@@ -5239,8 +5247,8 @@
         </p:nvSpPr>
         <p:spPr>
           <a:xfrm>
-            <a:off x="9327383" y="782248"/>
-            <a:ext cx="1924550" cy="318782"/>
+            <a:off x="9327382" y="782248"/>
+            <a:ext cx="2194057" cy="318781"/>
           </a:xfrm>
           <a:prstGeom prst="borderCallout1">
             <a:avLst>
@@ -5285,7 +5293,7 @@
                   <a:schemeClr val="tx1"/>
                 </a:solidFill>
               </a:rPr>
-              <a:t>: 0</a:t>
+              <a:t>: 0b000</a:t>
             </a:r>
             <a:endParaRPr lang="zh-CN" altLang="en-US" sz="1400" dirty="0">
               <a:solidFill>

</xml_diff>